<commit_message>
Curso de Programação C# M1 C5 P2
</commit_message>
<xml_diff>
--- a/curso/modulo1capitulo5.pptx
+++ b/curso/modulo1capitulo5.pptx
@@ -15,6 +15,7 @@
     <p:sldId id="263" r:id="rId9"/>
     <p:sldId id="264" r:id="rId10"/>
     <p:sldId id="265" r:id="rId11"/>
+    <p:sldId id="266" r:id="rId12"/>
   </p:sldIdLst>
   <p:sldSz cx="9144000" cy="6858000" type="screen4x3"/>
   <p:notesSz cx="6858000" cy="9144000"/>
@@ -501,7 +502,7 @@
             <a:fld id="{6B2AED99-3A78-46C3-A4E3-29F86B3E5DC3}" type="datetimeFigureOut">
               <a:rPr lang="pt-BR" smtClean="0"/>
               <a:pPr/>
-              <a:t>20/9/2014</a:t>
+              <a:t>27/9/2014</a:t>
             </a:fld>
             <a:endParaRPr lang="pt-BR"/>
           </a:p>
@@ -668,7 +669,7 @@
             <a:fld id="{6B2AED99-3A78-46C3-A4E3-29F86B3E5DC3}" type="datetimeFigureOut">
               <a:rPr lang="pt-BR" smtClean="0"/>
               <a:pPr/>
-              <a:t>20/9/2014</a:t>
+              <a:t>27/9/2014</a:t>
             </a:fld>
             <a:endParaRPr lang="pt-BR"/>
           </a:p>
@@ -845,7 +846,7 @@
             <a:fld id="{6B2AED99-3A78-46C3-A4E3-29F86B3E5DC3}" type="datetimeFigureOut">
               <a:rPr lang="pt-BR" smtClean="0"/>
               <a:pPr/>
-              <a:t>20/9/2014</a:t>
+              <a:t>27/9/2014</a:t>
             </a:fld>
             <a:endParaRPr lang="pt-BR"/>
           </a:p>
@@ -1016,7 +1017,7 @@
             <a:fld id="{6B2AED99-3A78-46C3-A4E3-29F86B3E5DC3}" type="datetimeFigureOut">
               <a:rPr lang="pt-BR" smtClean="0"/>
               <a:pPr/>
-              <a:t>20/9/2014</a:t>
+              <a:t>27/9/2014</a:t>
             </a:fld>
             <a:endParaRPr lang="pt-BR"/>
           </a:p>
@@ -1473,7 +1474,7 @@
             <a:fld id="{6B2AED99-3A78-46C3-A4E3-29F86B3E5DC3}" type="datetimeFigureOut">
               <a:rPr lang="pt-BR" smtClean="0"/>
               <a:pPr/>
-              <a:t>20/9/2014</a:t>
+              <a:t>27/9/2014</a:t>
             </a:fld>
             <a:endParaRPr lang="pt-BR"/>
           </a:p>
@@ -1739,7 +1740,7 @@
             <a:fld id="{6B2AED99-3A78-46C3-A4E3-29F86B3E5DC3}" type="datetimeFigureOut">
               <a:rPr lang="pt-BR" smtClean="0"/>
               <a:pPr/>
-              <a:t>20/9/2014</a:t>
+              <a:t>27/9/2014</a:t>
             </a:fld>
             <a:endParaRPr lang="pt-BR"/>
           </a:p>
@@ -2115,7 +2116,7 @@
             <a:fld id="{6B2AED99-3A78-46C3-A4E3-29F86B3E5DC3}" type="datetimeFigureOut">
               <a:rPr lang="pt-BR" smtClean="0"/>
               <a:pPr/>
-              <a:t>20/9/2014</a:t>
+              <a:t>27/9/2014</a:t>
             </a:fld>
             <a:endParaRPr lang="pt-BR"/>
           </a:p>
@@ -2239,7 +2240,7 @@
             <a:fld id="{6B2AED99-3A78-46C3-A4E3-29F86B3E5DC3}" type="datetimeFigureOut">
               <a:rPr lang="pt-BR" smtClean="0"/>
               <a:pPr/>
-              <a:t>20/9/2014</a:t>
+              <a:t>27/9/2014</a:t>
             </a:fld>
             <a:endParaRPr lang="pt-BR"/>
           </a:p>
@@ -2331,7 +2332,7 @@
             <a:fld id="{6B2AED99-3A78-46C3-A4E3-29F86B3E5DC3}" type="datetimeFigureOut">
               <a:rPr lang="pt-BR" smtClean="0"/>
               <a:pPr/>
-              <a:t>20/9/2014</a:t>
+              <a:t>27/9/2014</a:t>
             </a:fld>
             <a:endParaRPr lang="pt-BR"/>
           </a:p>
@@ -2582,7 +2583,7 @@
             <a:fld id="{6B2AED99-3A78-46C3-A4E3-29F86B3E5DC3}" type="datetimeFigureOut">
               <a:rPr lang="pt-BR" smtClean="0"/>
               <a:pPr/>
-              <a:t>20/9/2014</a:t>
+              <a:t>27/9/2014</a:t>
             </a:fld>
             <a:endParaRPr lang="pt-BR"/>
           </a:p>
@@ -2843,7 +2844,7 @@
             <a:fld id="{6B2AED99-3A78-46C3-A4E3-29F86B3E5DC3}" type="datetimeFigureOut">
               <a:rPr lang="pt-BR" smtClean="0"/>
               <a:pPr/>
-              <a:t>20/9/2014</a:t>
+              <a:t>27/9/2014</a:t>
             </a:fld>
             <a:endParaRPr lang="pt-BR"/>
           </a:p>
@@ -3249,7 +3250,7 @@
             <a:fld id="{6B2AED99-3A78-46C3-A4E3-29F86B3E5DC3}" type="datetimeFigureOut">
               <a:rPr lang="pt-BR" smtClean="0"/>
               <a:pPr/>
-              <a:t>20/9/2014</a:t>
+              <a:t>27/9/2014</a:t>
             </a:fld>
             <a:endParaRPr lang="pt-BR"/>
           </a:p>
@@ -3679,11 +3680,7 @@
             </a:br>
             <a:r>
               <a:rPr lang="pt-BR" dirty="0" smtClean="0"/>
-              <a:t>Capítulo </a:t>
-            </a:r>
-            <a:r>
-              <a:rPr lang="pt-BR" dirty="0" smtClean="0"/>
-              <a:t>5:</a:t>
+              <a:t>Capítulo 5:</a:t>
             </a:r>
             <a:br>
               <a:rPr lang="pt-BR" dirty="0" smtClean="0"/>
@@ -3855,6 +3852,101 @@
   <p:clrMapOvr>
     <a:masterClrMapping/>
   </p:clrMapOvr>
+  <p:timing>
+    <p:tnLst>
+      <p:par>
+        <p:cTn id="1" dur="indefinite" restart="never" nodeType="tmRoot"/>
+      </p:par>
+    </p:tnLst>
+  </p:timing>
+</p:sld>
+</file>
+
+<file path=ppt/slides/slide11.xml><?xml version="1.0" encoding="utf-8"?>
+<p:sld xmlns:a="http://schemas.openxmlformats.org/drawingml/2006/main" xmlns:r="http://schemas.openxmlformats.org/officeDocument/2006/relationships" xmlns:p="http://schemas.openxmlformats.org/presentationml/2006/main">
+  <p:cSld>
+    <p:spTree>
+      <p:nvGrpSpPr>
+        <p:cNvPr id="1" name=""/>
+        <p:cNvGrpSpPr/>
+        <p:nvPr/>
+      </p:nvGrpSpPr>
+      <p:grpSpPr>
+        <a:xfrm>
+          <a:off x="0" y="0"/>
+          <a:ext cx="0" cy="0"/>
+          <a:chOff x="0" y="0"/>
+          <a:chExt cx="0" cy="0"/>
+        </a:xfrm>
+      </p:grpSpPr>
+      <p:sp>
+        <p:nvSpPr>
+          <p:cNvPr id="2" name="Título 1"/>
+          <p:cNvSpPr>
+            <a:spLocks noGrp="1"/>
+          </p:cNvSpPr>
+          <p:nvPr>
+            <p:ph type="title"/>
+          </p:nvPr>
+        </p:nvSpPr>
+        <p:spPr/>
+        <p:txBody>
+          <a:bodyPr/>
+          <a:lstStyle/>
+          <a:p>
+            <a:r>
+              <a:rPr lang="pt-BR" dirty="0" smtClean="0"/>
+              <a:t>Elementos de um Vetor</a:t>
+            </a:r>
+            <a:endParaRPr lang="pt-BR" dirty="0"/>
+          </a:p>
+        </p:txBody>
+      </p:sp>
+      <p:pic>
+        <p:nvPicPr>
+          <p:cNvPr id="1026" name="Picture 2"/>
+          <p:cNvPicPr>
+            <a:picLocks noChangeAspect="1" noChangeArrowheads="1"/>
+          </p:cNvPicPr>
+          <p:nvPr/>
+        </p:nvPicPr>
+        <p:blipFill>
+          <a:blip r:embed="rId2"/>
+          <a:srcRect/>
+          <a:stretch>
+            <a:fillRect/>
+          </a:stretch>
+        </p:blipFill>
+        <p:spPr bwMode="auto">
+          <a:xfrm>
+            <a:off x="928662" y="1714488"/>
+            <a:ext cx="6615142" cy="4652267"/>
+          </a:xfrm>
+          <a:prstGeom prst="rect">
+            <a:avLst/>
+          </a:prstGeom>
+          <a:noFill/>
+          <a:ln w="9525">
+            <a:noFill/>
+            <a:miter lim="800000"/>
+            <a:headEnd/>
+            <a:tailEnd/>
+          </a:ln>
+          <a:effectLst/>
+        </p:spPr>
+      </p:pic>
+    </p:spTree>
+  </p:cSld>
+  <p:clrMapOvr>
+    <a:masterClrMapping/>
+  </p:clrMapOvr>
+  <p:timing>
+    <p:tnLst>
+      <p:par>
+        <p:cTn id="1" dur="indefinite" restart="never" nodeType="tmRoot"/>
+      </p:par>
+    </p:tnLst>
+  </p:timing>
 </p:sld>
 </file>
 
@@ -4069,6 +4161,13 @@
   <p:clrMapOvr>
     <a:masterClrMapping/>
   </p:clrMapOvr>
+  <p:timing>
+    <p:tnLst>
+      <p:par>
+        <p:cTn id="1" dur="indefinite" restart="never" nodeType="tmRoot"/>
+      </p:par>
+    </p:tnLst>
+  </p:timing>
 </p:sld>
 </file>
 
@@ -4252,6 +4351,13 @@
   <p:clrMapOvr>
     <a:masterClrMapping/>
   </p:clrMapOvr>
+  <p:timing>
+    <p:tnLst>
+      <p:par>
+        <p:cTn id="1" dur="indefinite" restart="never" nodeType="tmRoot"/>
+      </p:par>
+    </p:tnLst>
+  </p:timing>
 </p:sld>
 </file>
 
@@ -4446,6 +4552,13 @@
   <p:clrMapOvr>
     <a:masterClrMapping/>
   </p:clrMapOvr>
+  <p:timing>
+    <p:tnLst>
+      <p:par>
+        <p:cTn id="1" dur="indefinite" restart="never" nodeType="tmRoot"/>
+      </p:par>
+    </p:tnLst>
+  </p:timing>
 </p:sld>
 </file>
 
@@ -4590,6 +4703,13 @@
   <p:clrMapOvr>
     <a:masterClrMapping/>
   </p:clrMapOvr>
+  <p:timing>
+    <p:tnLst>
+      <p:par>
+        <p:cTn id="1" dur="indefinite" restart="never" nodeType="tmRoot"/>
+      </p:par>
+    </p:tnLst>
+  </p:timing>
 </p:sld>
 </file>
 
@@ -4745,7 +4865,42 @@
             </a:r>
             <a:r>
               <a:rPr lang="pt-BR" dirty="0" smtClean="0"/>
-              <a:t> = 14		X</a:t>
+              <a:t> = 14		</a:t>
+            </a:r>
+            <a:r>
+              <a:rPr lang="pt-BR" dirty="0" smtClean="0"/>
+              <a:t>X</a:t>
+            </a:r>
+            <a:r>
+              <a:rPr lang="pt-BR" baseline="-25000" dirty="0" smtClean="0"/>
+              <a:t>3</a:t>
+            </a:r>
+            <a:r>
+              <a:rPr lang="pt-BR" dirty="0" smtClean="0"/>
+              <a:t> </a:t>
+            </a:r>
+            <a:r>
+              <a:rPr lang="pt-BR" dirty="0" smtClean="0"/>
+              <a:t>= 35</a:t>
+            </a:r>
+          </a:p>
+          <a:p>
+            <a:pPr lvl="1"/>
+            <a:r>
+              <a:rPr lang="pt-BR" dirty="0" smtClean="0"/>
+              <a:t>X</a:t>
+            </a:r>
+            <a:r>
+              <a:rPr lang="pt-BR" baseline="-25000" dirty="0" smtClean="0"/>
+              <a:t>1</a:t>
+            </a:r>
+            <a:r>
+              <a:rPr lang="pt-BR" dirty="0" smtClean="0"/>
+              <a:t> = 92		</a:t>
+            </a:r>
+            <a:r>
+              <a:rPr lang="pt-BR" dirty="0" smtClean="0"/>
+              <a:t>X</a:t>
             </a:r>
             <a:r>
               <a:rPr lang="pt-BR" baseline="-25000" dirty="0" smtClean="0"/>
@@ -4753,30 +4908,11 @@
             </a:r>
             <a:r>
               <a:rPr lang="pt-BR" dirty="0" smtClean="0"/>
-              <a:t> = 35</a:t>
-            </a:r>
-          </a:p>
-          <a:p>
-            <a:pPr lvl="1"/>
-            <a:r>
-              <a:rPr lang="pt-BR" dirty="0" smtClean="0"/>
-              <a:t>X</a:t>
-            </a:r>
-            <a:r>
-              <a:rPr lang="pt-BR" baseline="-25000" dirty="0" smtClean="0"/>
-              <a:t>1</a:t>
-            </a:r>
-            <a:r>
-              <a:rPr lang="pt-BR" dirty="0" smtClean="0"/>
-              <a:t> = 92		X</a:t>
-            </a:r>
-            <a:r>
-              <a:rPr lang="pt-BR" baseline="-25000" dirty="0" smtClean="0"/>
-              <a:t>5</a:t>
-            </a:r>
-            <a:r>
-              <a:rPr lang="pt-BR" dirty="0" smtClean="0"/>
-              <a:t> = 78</a:t>
+              <a:t> </a:t>
+            </a:r>
+            <a:r>
+              <a:rPr lang="pt-BR" dirty="0" smtClean="0"/>
+              <a:t>= 78</a:t>
             </a:r>
           </a:p>
           <a:p>
@@ -5025,6 +5161,13 @@
   <p:clrMapOvr>
     <a:masterClrMapping/>
   </p:clrMapOvr>
+  <p:timing>
+    <p:tnLst>
+      <p:par>
+        <p:cTn id="1" dur="indefinite" restart="never" nodeType="tmRoot"/>
+      </p:par>
+    </p:tnLst>
+  </p:timing>
 </p:sld>
 </file>
 
@@ -5189,6 +5332,13 @@
   <p:clrMapOvr>
     <a:masterClrMapping/>
   </p:clrMapOvr>
+  <p:timing>
+    <p:tnLst>
+      <p:par>
+        <p:cTn id="1" dur="indefinite" restart="never" nodeType="tmRoot"/>
+      </p:par>
+    </p:tnLst>
+  </p:timing>
 </p:sld>
 </file>
 

</xml_diff>

<commit_message>
Alterando Módulo I para ter 10 capítulos
</commit_message>
<xml_diff>
--- a/curso/modulo1capitulo5.pptx
+++ b/curso/modulo1capitulo5.pptx
@@ -502,7 +502,7 @@
             <a:fld id="{6B2AED99-3A78-46C3-A4E3-29F86B3E5DC3}" type="datetimeFigureOut">
               <a:rPr lang="pt-BR" smtClean="0"/>
               <a:pPr/>
-              <a:t>27/9/2014</a:t>
+              <a:t>30/9/2014</a:t>
             </a:fld>
             <a:endParaRPr lang="pt-BR"/>
           </a:p>
@@ -669,7 +669,7 @@
             <a:fld id="{6B2AED99-3A78-46C3-A4E3-29F86B3E5DC3}" type="datetimeFigureOut">
               <a:rPr lang="pt-BR" smtClean="0"/>
               <a:pPr/>
-              <a:t>27/9/2014</a:t>
+              <a:t>30/9/2014</a:t>
             </a:fld>
             <a:endParaRPr lang="pt-BR"/>
           </a:p>
@@ -846,7 +846,7 @@
             <a:fld id="{6B2AED99-3A78-46C3-A4E3-29F86B3E5DC3}" type="datetimeFigureOut">
               <a:rPr lang="pt-BR" smtClean="0"/>
               <a:pPr/>
-              <a:t>27/9/2014</a:t>
+              <a:t>30/9/2014</a:t>
             </a:fld>
             <a:endParaRPr lang="pt-BR"/>
           </a:p>
@@ -1017,7 +1017,7 @@
             <a:fld id="{6B2AED99-3A78-46C3-A4E3-29F86B3E5DC3}" type="datetimeFigureOut">
               <a:rPr lang="pt-BR" smtClean="0"/>
               <a:pPr/>
-              <a:t>27/9/2014</a:t>
+              <a:t>30/9/2014</a:t>
             </a:fld>
             <a:endParaRPr lang="pt-BR"/>
           </a:p>
@@ -1474,7 +1474,7 @@
             <a:fld id="{6B2AED99-3A78-46C3-A4E3-29F86B3E5DC3}" type="datetimeFigureOut">
               <a:rPr lang="pt-BR" smtClean="0"/>
               <a:pPr/>
-              <a:t>27/9/2014</a:t>
+              <a:t>30/9/2014</a:t>
             </a:fld>
             <a:endParaRPr lang="pt-BR"/>
           </a:p>
@@ -1740,7 +1740,7 @@
             <a:fld id="{6B2AED99-3A78-46C3-A4E3-29F86B3E5DC3}" type="datetimeFigureOut">
               <a:rPr lang="pt-BR" smtClean="0"/>
               <a:pPr/>
-              <a:t>27/9/2014</a:t>
+              <a:t>30/9/2014</a:t>
             </a:fld>
             <a:endParaRPr lang="pt-BR"/>
           </a:p>
@@ -2116,7 +2116,7 @@
             <a:fld id="{6B2AED99-3A78-46C3-A4E3-29F86B3E5DC3}" type="datetimeFigureOut">
               <a:rPr lang="pt-BR" smtClean="0"/>
               <a:pPr/>
-              <a:t>27/9/2014</a:t>
+              <a:t>30/9/2014</a:t>
             </a:fld>
             <a:endParaRPr lang="pt-BR"/>
           </a:p>
@@ -2240,7 +2240,7 @@
             <a:fld id="{6B2AED99-3A78-46C3-A4E3-29F86B3E5DC3}" type="datetimeFigureOut">
               <a:rPr lang="pt-BR" smtClean="0"/>
               <a:pPr/>
-              <a:t>27/9/2014</a:t>
+              <a:t>30/9/2014</a:t>
             </a:fld>
             <a:endParaRPr lang="pt-BR"/>
           </a:p>
@@ -2332,7 +2332,7 @@
             <a:fld id="{6B2AED99-3A78-46C3-A4E3-29F86B3E5DC3}" type="datetimeFigureOut">
               <a:rPr lang="pt-BR" smtClean="0"/>
               <a:pPr/>
-              <a:t>27/9/2014</a:t>
+              <a:t>30/9/2014</a:t>
             </a:fld>
             <a:endParaRPr lang="pt-BR"/>
           </a:p>
@@ -2583,7 +2583,7 @@
             <a:fld id="{6B2AED99-3A78-46C3-A4E3-29F86B3E5DC3}" type="datetimeFigureOut">
               <a:rPr lang="pt-BR" smtClean="0"/>
               <a:pPr/>
-              <a:t>27/9/2014</a:t>
+              <a:t>30/9/2014</a:t>
             </a:fld>
             <a:endParaRPr lang="pt-BR"/>
           </a:p>
@@ -2844,7 +2844,7 @@
             <a:fld id="{6B2AED99-3A78-46C3-A4E3-29F86B3E5DC3}" type="datetimeFigureOut">
               <a:rPr lang="pt-BR" smtClean="0"/>
               <a:pPr/>
-              <a:t>27/9/2014</a:t>
+              <a:t>30/9/2014</a:t>
             </a:fld>
             <a:endParaRPr lang="pt-BR"/>
           </a:p>
@@ -3250,7 +3250,7 @@
             <a:fld id="{6B2AED99-3A78-46C3-A4E3-29F86B3E5DC3}" type="datetimeFigureOut">
               <a:rPr lang="pt-BR" smtClean="0"/>
               <a:pPr/>
-              <a:t>27/9/2014</a:t>
+              <a:t>30/9/2014</a:t>
             </a:fld>
             <a:endParaRPr lang="pt-BR"/>
           </a:p>
@@ -4025,8 +4025,9 @@
           <a:p>
             <a:r>
               <a:rPr lang="pt-BR" dirty="0" smtClean="0"/>
-              <a:t>Busca em Vetor</a:t>
-            </a:r>
+              <a:t>Busca, Inserção e Remoção</a:t>
+            </a:r>
+            <a:endParaRPr lang="pt-BR" dirty="0" smtClean="0"/>
           </a:p>
           <a:p>
             <a:r>
@@ -4865,11 +4866,7 @@
             </a:r>
             <a:r>
               <a:rPr lang="pt-BR" dirty="0" smtClean="0"/>
-              <a:t> = 14		</a:t>
-            </a:r>
-            <a:r>
-              <a:rPr lang="pt-BR" dirty="0" smtClean="0"/>
-              <a:t>X</a:t>
+              <a:t> = 14		X</a:t>
             </a:r>
             <a:r>
               <a:rPr lang="pt-BR" baseline="-25000" dirty="0" smtClean="0"/>
@@ -4877,11 +4874,7 @@
             </a:r>
             <a:r>
               <a:rPr lang="pt-BR" dirty="0" smtClean="0"/>
-              <a:t> </a:t>
-            </a:r>
-            <a:r>
-              <a:rPr lang="pt-BR" dirty="0" smtClean="0"/>
-              <a:t>= 35</a:t>
+              <a:t> = 35</a:t>
             </a:r>
           </a:p>
           <a:p>
@@ -4896,11 +4889,7 @@
             </a:r>
             <a:r>
               <a:rPr lang="pt-BR" dirty="0" smtClean="0"/>
-              <a:t> = 92		</a:t>
-            </a:r>
-            <a:r>
-              <a:rPr lang="pt-BR" dirty="0" smtClean="0"/>
-              <a:t>X</a:t>
+              <a:t> = 92		X</a:t>
             </a:r>
             <a:r>
               <a:rPr lang="pt-BR" baseline="-25000" dirty="0" smtClean="0"/>
@@ -4908,11 +4897,7 @@
             </a:r>
             <a:r>
               <a:rPr lang="pt-BR" dirty="0" smtClean="0"/>
-              <a:t> </a:t>
-            </a:r>
-            <a:r>
-              <a:rPr lang="pt-BR" dirty="0" smtClean="0"/>
-              <a:t>= 78</a:t>
+              <a:t> = 78</a:t>
             </a:r>
           </a:p>
           <a:p>

</xml_diff>

<commit_message>
Adicionando mais exercícios à lista 5
</commit_message>
<xml_diff>
--- a/curso/modulo1capitulo5.pptx
+++ b/curso/modulo1capitulo5.pptx
@@ -16,6 +16,9 @@
     <p:sldId id="264" r:id="rId10"/>
     <p:sldId id="265" r:id="rId11"/>
     <p:sldId id="266" r:id="rId12"/>
+    <p:sldId id="267" r:id="rId13"/>
+    <p:sldId id="268" r:id="rId14"/>
+    <p:sldId id="269" r:id="rId15"/>
   </p:sldIdLst>
   <p:sldSz cx="9144000" cy="6858000" type="screen4x3"/>
   <p:notesSz cx="6858000" cy="9144000"/>
@@ -502,7 +505,7 @@
             <a:fld id="{6B2AED99-3A78-46C3-A4E3-29F86B3E5DC3}" type="datetimeFigureOut">
               <a:rPr lang="pt-BR" smtClean="0"/>
               <a:pPr/>
-              <a:t>30/9/2014</a:t>
+              <a:t>2/10/2014</a:t>
             </a:fld>
             <a:endParaRPr lang="pt-BR"/>
           </a:p>
@@ -669,7 +672,7 @@
             <a:fld id="{6B2AED99-3A78-46C3-A4E3-29F86B3E5DC3}" type="datetimeFigureOut">
               <a:rPr lang="pt-BR" smtClean="0"/>
               <a:pPr/>
-              <a:t>30/9/2014</a:t>
+              <a:t>2/10/2014</a:t>
             </a:fld>
             <a:endParaRPr lang="pt-BR"/>
           </a:p>
@@ -846,7 +849,7 @@
             <a:fld id="{6B2AED99-3A78-46C3-A4E3-29F86B3E5DC3}" type="datetimeFigureOut">
               <a:rPr lang="pt-BR" smtClean="0"/>
               <a:pPr/>
-              <a:t>30/9/2014</a:t>
+              <a:t>2/10/2014</a:t>
             </a:fld>
             <a:endParaRPr lang="pt-BR"/>
           </a:p>
@@ -1017,7 +1020,7 @@
             <a:fld id="{6B2AED99-3A78-46C3-A4E3-29F86B3E5DC3}" type="datetimeFigureOut">
               <a:rPr lang="pt-BR" smtClean="0"/>
               <a:pPr/>
-              <a:t>30/9/2014</a:t>
+              <a:t>2/10/2014</a:t>
             </a:fld>
             <a:endParaRPr lang="pt-BR"/>
           </a:p>
@@ -1474,7 +1477,7 @@
             <a:fld id="{6B2AED99-3A78-46C3-A4E3-29F86B3E5DC3}" type="datetimeFigureOut">
               <a:rPr lang="pt-BR" smtClean="0"/>
               <a:pPr/>
-              <a:t>30/9/2014</a:t>
+              <a:t>2/10/2014</a:t>
             </a:fld>
             <a:endParaRPr lang="pt-BR"/>
           </a:p>
@@ -1740,7 +1743,7 @@
             <a:fld id="{6B2AED99-3A78-46C3-A4E3-29F86B3E5DC3}" type="datetimeFigureOut">
               <a:rPr lang="pt-BR" smtClean="0"/>
               <a:pPr/>
-              <a:t>30/9/2014</a:t>
+              <a:t>2/10/2014</a:t>
             </a:fld>
             <a:endParaRPr lang="pt-BR"/>
           </a:p>
@@ -2116,7 +2119,7 @@
             <a:fld id="{6B2AED99-3A78-46C3-A4E3-29F86B3E5DC3}" type="datetimeFigureOut">
               <a:rPr lang="pt-BR" smtClean="0"/>
               <a:pPr/>
-              <a:t>30/9/2014</a:t>
+              <a:t>2/10/2014</a:t>
             </a:fld>
             <a:endParaRPr lang="pt-BR"/>
           </a:p>
@@ -2240,7 +2243,7 @@
             <a:fld id="{6B2AED99-3A78-46C3-A4E3-29F86B3E5DC3}" type="datetimeFigureOut">
               <a:rPr lang="pt-BR" smtClean="0"/>
               <a:pPr/>
-              <a:t>30/9/2014</a:t>
+              <a:t>2/10/2014</a:t>
             </a:fld>
             <a:endParaRPr lang="pt-BR"/>
           </a:p>
@@ -2332,7 +2335,7 @@
             <a:fld id="{6B2AED99-3A78-46C3-A4E3-29F86B3E5DC3}" type="datetimeFigureOut">
               <a:rPr lang="pt-BR" smtClean="0"/>
               <a:pPr/>
-              <a:t>30/9/2014</a:t>
+              <a:t>2/10/2014</a:t>
             </a:fld>
             <a:endParaRPr lang="pt-BR"/>
           </a:p>
@@ -2583,7 +2586,7 @@
             <a:fld id="{6B2AED99-3A78-46C3-A4E3-29F86B3E5DC3}" type="datetimeFigureOut">
               <a:rPr lang="pt-BR" smtClean="0"/>
               <a:pPr/>
-              <a:t>30/9/2014</a:t>
+              <a:t>2/10/2014</a:t>
             </a:fld>
             <a:endParaRPr lang="pt-BR"/>
           </a:p>
@@ -2844,7 +2847,7 @@
             <a:fld id="{6B2AED99-3A78-46C3-A4E3-29F86B3E5DC3}" type="datetimeFigureOut">
               <a:rPr lang="pt-BR" smtClean="0"/>
               <a:pPr/>
-              <a:t>30/9/2014</a:t>
+              <a:t>2/10/2014</a:t>
             </a:fld>
             <a:endParaRPr lang="pt-BR"/>
           </a:p>
@@ -3250,7 +3253,7 @@
             <a:fld id="{6B2AED99-3A78-46C3-A4E3-29F86B3E5DC3}" type="datetimeFigureOut">
               <a:rPr lang="pt-BR" smtClean="0"/>
               <a:pPr/>
-              <a:t>30/9/2014</a:t>
+              <a:t>2/10/2014</a:t>
             </a:fld>
             <a:endParaRPr lang="pt-BR"/>
           </a:p>
@@ -3950,6 +3953,355 @@
 </p:sld>
 </file>
 
+<file path=ppt/slides/slide12.xml><?xml version="1.0" encoding="utf-8"?>
+<p:sld xmlns:a="http://schemas.openxmlformats.org/drawingml/2006/main" xmlns:r="http://schemas.openxmlformats.org/officeDocument/2006/relationships" xmlns:p="http://schemas.openxmlformats.org/presentationml/2006/main">
+  <p:cSld>
+    <p:spTree>
+      <p:nvGrpSpPr>
+        <p:cNvPr id="1" name=""/>
+        <p:cNvGrpSpPr/>
+        <p:nvPr/>
+      </p:nvGrpSpPr>
+      <p:grpSpPr>
+        <a:xfrm>
+          <a:off x="0" y="0"/>
+          <a:ext cx="0" cy="0"/>
+          <a:chOff x="0" y="0"/>
+          <a:chExt cx="0" cy="0"/>
+        </a:xfrm>
+      </p:grpSpPr>
+      <p:sp>
+        <p:nvSpPr>
+          <p:cNvPr id="2" name="Título 1"/>
+          <p:cNvSpPr>
+            <a:spLocks noGrp="1"/>
+          </p:cNvSpPr>
+          <p:nvPr>
+            <p:ph type="title"/>
+          </p:nvPr>
+        </p:nvSpPr>
+        <p:spPr/>
+        <p:txBody>
+          <a:bodyPr/>
+          <a:lstStyle/>
+          <a:p>
+            <a:r>
+              <a:rPr lang="pt-BR" dirty="0" smtClean="0"/>
+              <a:t>Busca</a:t>
+            </a:r>
+            <a:endParaRPr lang="pt-BR" dirty="0"/>
+          </a:p>
+        </p:txBody>
+      </p:sp>
+      <p:sp>
+        <p:nvSpPr>
+          <p:cNvPr id="3" name="Espaço Reservado para Conteúdo 2"/>
+          <p:cNvSpPr>
+            <a:spLocks noGrp="1"/>
+          </p:cNvSpPr>
+          <p:nvPr>
+            <p:ph idx="1"/>
+          </p:nvPr>
+        </p:nvSpPr>
+        <p:spPr/>
+        <p:txBody>
+          <a:bodyPr>
+            <a:normAutofit lnSpcReduction="10000"/>
+          </a:bodyPr>
+          <a:lstStyle/>
+          <a:p>
+            <a:r>
+              <a:rPr lang="pt-BR" dirty="0" smtClean="0"/>
+              <a:t>Podemos buscar um elemento em um vetor pelo seu </a:t>
+            </a:r>
+            <a:r>
+              <a:rPr lang="pt-BR" dirty="0" smtClean="0">
+                <a:solidFill>
+                  <a:srgbClr val="92D050"/>
+                </a:solidFill>
+              </a:rPr>
+              <a:t>índice</a:t>
+            </a:r>
+            <a:r>
+              <a:rPr lang="pt-BR" dirty="0" smtClean="0"/>
+              <a:t> ou pelo seu </a:t>
+            </a:r>
+            <a:r>
+              <a:rPr lang="pt-BR" dirty="0" smtClean="0">
+                <a:solidFill>
+                  <a:srgbClr val="92D050"/>
+                </a:solidFill>
+              </a:rPr>
+              <a:t>valor</a:t>
+            </a:r>
+            <a:endParaRPr lang="pt-BR" dirty="0" smtClean="0"/>
+          </a:p>
+          <a:p>
+            <a:r>
+              <a:rPr lang="pt-BR" dirty="0" smtClean="0"/>
+              <a:t>A busca por índice é instantânea</a:t>
+            </a:r>
+          </a:p>
+          <a:p>
+            <a:r>
+              <a:rPr lang="pt-BR" dirty="0" smtClean="0"/>
+              <a:t>A busca por valor pode ser feita de duas formas:</a:t>
+            </a:r>
+          </a:p>
+          <a:p>
+            <a:pPr lvl="1"/>
+            <a:r>
+              <a:rPr lang="pt-BR" dirty="0" err="1" smtClean="0">
+                <a:solidFill>
+                  <a:srgbClr val="92D050"/>
+                </a:solidFill>
+              </a:rPr>
+              <a:t>Sequencial</a:t>
+            </a:r>
+            <a:r>
+              <a:rPr lang="pt-BR" dirty="0" smtClean="0"/>
+              <a:t>: Percorre todos os elementos do vetor até encontrar</a:t>
+            </a:r>
+          </a:p>
+          <a:p>
+            <a:pPr lvl="1"/>
+            <a:r>
+              <a:rPr lang="pt-BR" dirty="0" smtClean="0">
+                <a:solidFill>
+                  <a:srgbClr val="92D050"/>
+                </a:solidFill>
+              </a:rPr>
+              <a:t>Binária</a:t>
+            </a:r>
+            <a:r>
+              <a:rPr lang="pt-BR" dirty="0" smtClean="0"/>
+              <a:t>: Só funciona em vetores ordenados. Vai dividindo o vetor ao meio até encontrar o elemento</a:t>
+            </a:r>
+            <a:endParaRPr lang="pt-BR" dirty="0"/>
+          </a:p>
+        </p:txBody>
+      </p:sp>
+    </p:spTree>
+  </p:cSld>
+  <p:clrMapOvr>
+    <a:masterClrMapping/>
+  </p:clrMapOvr>
+</p:sld>
+</file>
+
+<file path=ppt/slides/slide13.xml><?xml version="1.0" encoding="utf-8"?>
+<p:sld xmlns:a="http://schemas.openxmlformats.org/drawingml/2006/main" xmlns:r="http://schemas.openxmlformats.org/officeDocument/2006/relationships" xmlns:p="http://schemas.openxmlformats.org/presentationml/2006/main">
+  <p:cSld>
+    <p:spTree>
+      <p:nvGrpSpPr>
+        <p:cNvPr id="1" name=""/>
+        <p:cNvGrpSpPr/>
+        <p:nvPr/>
+      </p:nvGrpSpPr>
+      <p:grpSpPr>
+        <a:xfrm>
+          <a:off x="0" y="0"/>
+          <a:ext cx="0" cy="0"/>
+          <a:chOff x="0" y="0"/>
+          <a:chExt cx="0" cy="0"/>
+        </a:xfrm>
+      </p:grpSpPr>
+      <p:sp>
+        <p:nvSpPr>
+          <p:cNvPr id="2" name="Título 1"/>
+          <p:cNvSpPr>
+            <a:spLocks noGrp="1"/>
+          </p:cNvSpPr>
+          <p:nvPr>
+            <p:ph type="title"/>
+          </p:nvPr>
+        </p:nvSpPr>
+        <p:spPr/>
+        <p:txBody>
+          <a:bodyPr/>
+          <a:lstStyle/>
+          <a:p>
+            <a:r>
+              <a:rPr lang="pt-BR" dirty="0" smtClean="0"/>
+              <a:t>Inserção</a:t>
+            </a:r>
+            <a:endParaRPr lang="pt-BR" dirty="0"/>
+          </a:p>
+        </p:txBody>
+      </p:sp>
+      <p:sp>
+        <p:nvSpPr>
+          <p:cNvPr id="3" name="Espaço Reservado para Conteúdo 2"/>
+          <p:cNvSpPr>
+            <a:spLocks noGrp="1"/>
+          </p:cNvSpPr>
+          <p:nvPr>
+            <p:ph idx="1"/>
+          </p:nvPr>
+        </p:nvSpPr>
+        <p:spPr/>
+        <p:txBody>
+          <a:bodyPr>
+            <a:normAutofit fontScale="92500"/>
+          </a:bodyPr>
+          <a:lstStyle/>
+          <a:p>
+            <a:r>
+              <a:rPr lang="pt-BR" dirty="0" smtClean="0"/>
+              <a:t>Em vetores estáticos, não é possível inserir ou remover elementos</a:t>
+            </a:r>
+          </a:p>
+          <a:p>
+            <a:r>
+              <a:rPr lang="pt-BR" dirty="0" smtClean="0"/>
+              <a:t>Isso só é possível em vetores dinâmicos</a:t>
+            </a:r>
+          </a:p>
+          <a:p>
+            <a:r>
+              <a:rPr lang="pt-BR" dirty="0" smtClean="0"/>
+              <a:t>Para um vetor estático de tamanho N:</a:t>
+            </a:r>
+          </a:p>
+          <a:p>
+            <a:pPr lvl="1"/>
+            <a:r>
+              <a:rPr lang="pt-BR" dirty="0" smtClean="0"/>
+              <a:t>Copie o vetor original para um vetor temporário</a:t>
+            </a:r>
+          </a:p>
+          <a:p>
+            <a:pPr lvl="1"/>
+            <a:r>
+              <a:rPr lang="pt-BR" dirty="0" smtClean="0"/>
+              <a:t>Realoque o vetor original com tamanho N+1</a:t>
+            </a:r>
+          </a:p>
+          <a:p>
+            <a:pPr lvl="1"/>
+            <a:r>
+              <a:rPr lang="pt-BR" dirty="0" smtClean="0"/>
+              <a:t>Copie todos os elementos do vetor temporário para o vetor original</a:t>
+            </a:r>
+          </a:p>
+          <a:p>
+            <a:pPr lvl="1"/>
+            <a:r>
+              <a:rPr lang="pt-BR" dirty="0" smtClean="0"/>
+              <a:t>Armazene o valor a ser inserido na última posição</a:t>
+            </a:r>
+          </a:p>
+        </p:txBody>
+      </p:sp>
+    </p:spTree>
+  </p:cSld>
+  <p:clrMapOvr>
+    <a:masterClrMapping/>
+  </p:clrMapOvr>
+</p:sld>
+</file>
+
+<file path=ppt/slides/slide14.xml><?xml version="1.0" encoding="utf-8"?>
+<p:sld xmlns:a="http://schemas.openxmlformats.org/drawingml/2006/main" xmlns:r="http://schemas.openxmlformats.org/officeDocument/2006/relationships" xmlns:p="http://schemas.openxmlformats.org/presentationml/2006/main">
+  <p:cSld>
+    <p:spTree>
+      <p:nvGrpSpPr>
+        <p:cNvPr id="1" name=""/>
+        <p:cNvGrpSpPr/>
+        <p:nvPr/>
+      </p:nvGrpSpPr>
+      <p:grpSpPr>
+        <a:xfrm>
+          <a:off x="0" y="0"/>
+          <a:ext cx="0" cy="0"/>
+          <a:chOff x="0" y="0"/>
+          <a:chExt cx="0" cy="0"/>
+        </a:xfrm>
+      </p:grpSpPr>
+      <p:sp>
+        <p:nvSpPr>
+          <p:cNvPr id="2" name="Título 1"/>
+          <p:cNvSpPr>
+            <a:spLocks noGrp="1"/>
+          </p:cNvSpPr>
+          <p:nvPr>
+            <p:ph type="title"/>
+          </p:nvPr>
+        </p:nvSpPr>
+        <p:spPr/>
+        <p:txBody>
+          <a:bodyPr/>
+          <a:lstStyle/>
+          <a:p>
+            <a:r>
+              <a:rPr lang="pt-BR" dirty="0" smtClean="0"/>
+              <a:t>Remoção</a:t>
+            </a:r>
+            <a:endParaRPr lang="pt-BR" dirty="0"/>
+          </a:p>
+        </p:txBody>
+      </p:sp>
+      <p:sp>
+        <p:nvSpPr>
+          <p:cNvPr id="3" name="Espaço Reservado para Conteúdo 2"/>
+          <p:cNvSpPr>
+            <a:spLocks noGrp="1"/>
+          </p:cNvSpPr>
+          <p:nvPr>
+            <p:ph idx="1"/>
+          </p:nvPr>
+        </p:nvSpPr>
+        <p:spPr/>
+        <p:txBody>
+          <a:bodyPr>
+            <a:normAutofit fontScale="92500"/>
+          </a:bodyPr>
+          <a:lstStyle/>
+          <a:p>
+            <a:r>
+              <a:rPr lang="pt-BR" dirty="0" smtClean="0"/>
+              <a:t>Em vetores estáticos, a remoção também é possível apenas com o auxílio de um vetor temporário:</a:t>
+            </a:r>
+          </a:p>
+          <a:p>
+            <a:pPr lvl="1"/>
+            <a:r>
+              <a:rPr lang="pt-BR" dirty="0" smtClean="0"/>
+              <a:t>Copie o vetor original para um vetor temporário</a:t>
+            </a:r>
+          </a:p>
+          <a:p>
+            <a:pPr lvl="1"/>
+            <a:r>
+              <a:rPr lang="pt-BR" dirty="0" smtClean="0"/>
+              <a:t>Busque o elemento a ser removido e armazene seu índice</a:t>
+            </a:r>
+          </a:p>
+          <a:p>
+            <a:pPr lvl="1"/>
+            <a:r>
+              <a:rPr lang="pt-BR" dirty="0" smtClean="0"/>
+              <a:t>Realoque o vetor original com tamanho N-1</a:t>
+            </a:r>
+          </a:p>
+          <a:p>
+            <a:pPr lvl="1"/>
+            <a:r>
+              <a:rPr lang="pt-BR" dirty="0" smtClean="0"/>
+              <a:t>Copie todos os elementos do vetor temporário para o vetor original, mas pulando o índice do elemento a ser removido</a:t>
+            </a:r>
+            <a:endParaRPr lang="pt-BR" dirty="0"/>
+          </a:p>
+        </p:txBody>
+      </p:sp>
+    </p:spTree>
+  </p:cSld>
+  <p:clrMapOvr>
+    <a:masterClrMapping/>
+  </p:clrMapOvr>
+</p:sld>
+</file>
+
 <file path=ppt/slides/slide2.xml><?xml version="1.0" encoding="utf-8"?>
 <p:sld xmlns:a="http://schemas.openxmlformats.org/drawingml/2006/main" xmlns:r="http://schemas.openxmlformats.org/officeDocument/2006/relationships" xmlns:p="http://schemas.openxmlformats.org/presentationml/2006/main">
   <p:cSld>
@@ -4027,7 +4379,6 @@
               <a:rPr lang="pt-BR" dirty="0" smtClean="0"/>
               <a:t>Busca, Inserção e Remoção</a:t>
             </a:r>
-            <a:endParaRPr lang="pt-BR" dirty="0" smtClean="0"/>
           </a:p>
           <a:p>
             <a:r>

</xml_diff>

<commit_message>
Atualizando slides capítulo 5
</commit_message>
<xml_diff>
--- a/curso/modulo1capitulo5.pptx
+++ b/curso/modulo1capitulo5.pptx
@@ -4142,7 +4142,7 @@
         <p:spPr/>
         <p:txBody>
           <a:bodyPr>
-            <a:normAutofit fontScale="92500"/>
+            <a:normAutofit fontScale="92500" lnSpcReduction="20000"/>
           </a:bodyPr>
           <a:lstStyle/>
           <a:p>
@@ -4189,6 +4189,20 @@
             <a:r>
               <a:rPr lang="pt-BR" dirty="0" smtClean="0"/>
               <a:t>Armazene o valor a ser inserido na última posição</a:t>
+            </a:r>
+          </a:p>
+          <a:p>
+            <a:r>
+              <a:rPr lang="pt-BR" dirty="0" smtClean="0"/>
+              <a:t>O problema é mais complexo se desejarmos que a inserção seja </a:t>
+            </a:r>
+            <a:r>
+              <a:rPr lang="pt-BR" dirty="0" smtClean="0">
+                <a:solidFill>
+                  <a:srgbClr val="92D050"/>
+                </a:solidFill>
+              </a:rPr>
+              <a:t>ordenada</a:t>
             </a:r>
           </a:p>
         </p:txBody>
@@ -4354,7 +4368,9 @@
         </p:nvSpPr>
         <p:spPr/>
         <p:txBody>
-          <a:bodyPr/>
+          <a:bodyPr>
+            <a:normAutofit lnSpcReduction="10000"/>
+          </a:bodyPr>
           <a:lstStyle/>
           <a:p>
             <a:r>
@@ -4383,8 +4399,40 @@
           <a:p>
             <a:r>
               <a:rPr lang="pt-BR" dirty="0" smtClean="0"/>
-              <a:t>Vetores Dinâmicos</a:t>
-            </a:r>
+              <a:t>Vetores </a:t>
+            </a:r>
+            <a:r>
+              <a:rPr lang="pt-BR" dirty="0" smtClean="0"/>
+              <a:t>Dinâmicos</a:t>
+            </a:r>
+          </a:p>
+          <a:p>
+            <a:pPr lvl="1"/>
+            <a:r>
+              <a:rPr lang="pt-BR" dirty="0" err="1" smtClean="0"/>
+              <a:t>LinkedList</a:t>
+            </a:r>
+            <a:endParaRPr lang="pt-BR" dirty="0" smtClean="0"/>
+          </a:p>
+          <a:p>
+            <a:pPr lvl="1"/>
+            <a:r>
+              <a:rPr lang="pt-BR" dirty="0" err="1" smtClean="0"/>
+              <a:t>ArrayList</a:t>
+            </a:r>
+            <a:endParaRPr lang="pt-BR" dirty="0" smtClean="0"/>
+          </a:p>
+          <a:p>
+            <a:pPr lvl="1"/>
+            <a:r>
+              <a:rPr lang="pt-BR" dirty="0" err="1" smtClean="0"/>
+              <a:t>List</a:t>
+            </a:r>
+            <a:r>
+              <a:rPr lang="pt-BR" dirty="0" smtClean="0"/>
+              <a:t>&lt;T&gt;</a:t>
+            </a:r>
+            <a:endParaRPr lang="pt-BR" dirty="0" smtClean="0"/>
           </a:p>
           <a:p>
             <a:r>

</xml_diff>

<commit_message>
Atualizando slides Cap 5
</commit_message>
<xml_diff>
--- a/curso/modulo1capitulo5.pptx
+++ b/curso/modulo1capitulo5.pptx
@@ -19,6 +19,16 @@
     <p:sldId id="267" r:id="rId13"/>
     <p:sldId id="268" r:id="rId14"/>
     <p:sldId id="269" r:id="rId15"/>
+    <p:sldId id="277" r:id="rId16"/>
+    <p:sldId id="278" r:id="rId17"/>
+    <p:sldId id="270" r:id="rId18"/>
+    <p:sldId id="271" r:id="rId19"/>
+    <p:sldId id="272" r:id="rId20"/>
+    <p:sldId id="273" r:id="rId21"/>
+    <p:sldId id="274" r:id="rId22"/>
+    <p:sldId id="275" r:id="rId23"/>
+    <p:sldId id="276" r:id="rId24"/>
+    <p:sldId id="279" r:id="rId25"/>
   </p:sldIdLst>
   <p:sldSz cx="9144000" cy="6858000" type="screen4x3"/>
   <p:notesSz cx="6858000" cy="9144000"/>
@@ -505,7 +515,7 @@
             <a:fld id="{6B2AED99-3A78-46C3-A4E3-29F86B3E5DC3}" type="datetimeFigureOut">
               <a:rPr lang="pt-BR" smtClean="0"/>
               <a:pPr/>
-              <a:t>2/10/2014</a:t>
+              <a:t>6/10/2014</a:t>
             </a:fld>
             <a:endParaRPr lang="pt-BR"/>
           </a:p>
@@ -672,7 +682,7 @@
             <a:fld id="{6B2AED99-3A78-46C3-A4E3-29F86B3E5DC3}" type="datetimeFigureOut">
               <a:rPr lang="pt-BR" smtClean="0"/>
               <a:pPr/>
-              <a:t>2/10/2014</a:t>
+              <a:t>6/10/2014</a:t>
             </a:fld>
             <a:endParaRPr lang="pt-BR"/>
           </a:p>
@@ -849,7 +859,7 @@
             <a:fld id="{6B2AED99-3A78-46C3-A4E3-29F86B3E5DC3}" type="datetimeFigureOut">
               <a:rPr lang="pt-BR" smtClean="0"/>
               <a:pPr/>
-              <a:t>2/10/2014</a:t>
+              <a:t>6/10/2014</a:t>
             </a:fld>
             <a:endParaRPr lang="pt-BR"/>
           </a:p>
@@ -1020,7 +1030,7 @@
             <a:fld id="{6B2AED99-3A78-46C3-A4E3-29F86B3E5DC3}" type="datetimeFigureOut">
               <a:rPr lang="pt-BR" smtClean="0"/>
               <a:pPr/>
-              <a:t>2/10/2014</a:t>
+              <a:t>6/10/2014</a:t>
             </a:fld>
             <a:endParaRPr lang="pt-BR"/>
           </a:p>
@@ -1477,7 +1487,7 @@
             <a:fld id="{6B2AED99-3A78-46C3-A4E3-29F86B3E5DC3}" type="datetimeFigureOut">
               <a:rPr lang="pt-BR" smtClean="0"/>
               <a:pPr/>
-              <a:t>2/10/2014</a:t>
+              <a:t>6/10/2014</a:t>
             </a:fld>
             <a:endParaRPr lang="pt-BR"/>
           </a:p>
@@ -1743,7 +1753,7 @@
             <a:fld id="{6B2AED99-3A78-46C3-A4E3-29F86B3E5DC3}" type="datetimeFigureOut">
               <a:rPr lang="pt-BR" smtClean="0"/>
               <a:pPr/>
-              <a:t>2/10/2014</a:t>
+              <a:t>6/10/2014</a:t>
             </a:fld>
             <a:endParaRPr lang="pt-BR"/>
           </a:p>
@@ -2119,7 +2129,7 @@
             <a:fld id="{6B2AED99-3A78-46C3-A4E3-29F86B3E5DC3}" type="datetimeFigureOut">
               <a:rPr lang="pt-BR" smtClean="0"/>
               <a:pPr/>
-              <a:t>2/10/2014</a:t>
+              <a:t>6/10/2014</a:t>
             </a:fld>
             <a:endParaRPr lang="pt-BR"/>
           </a:p>
@@ -2243,7 +2253,7 @@
             <a:fld id="{6B2AED99-3A78-46C3-A4E3-29F86B3E5DC3}" type="datetimeFigureOut">
               <a:rPr lang="pt-BR" smtClean="0"/>
               <a:pPr/>
-              <a:t>2/10/2014</a:t>
+              <a:t>6/10/2014</a:t>
             </a:fld>
             <a:endParaRPr lang="pt-BR"/>
           </a:p>
@@ -2335,7 +2345,7 @@
             <a:fld id="{6B2AED99-3A78-46C3-A4E3-29F86B3E5DC3}" type="datetimeFigureOut">
               <a:rPr lang="pt-BR" smtClean="0"/>
               <a:pPr/>
-              <a:t>2/10/2014</a:t>
+              <a:t>6/10/2014</a:t>
             </a:fld>
             <a:endParaRPr lang="pt-BR"/>
           </a:p>
@@ -2586,7 +2596,7 @@
             <a:fld id="{6B2AED99-3A78-46C3-A4E3-29F86B3E5DC3}" type="datetimeFigureOut">
               <a:rPr lang="pt-BR" smtClean="0"/>
               <a:pPr/>
-              <a:t>2/10/2014</a:t>
+              <a:t>6/10/2014</a:t>
             </a:fld>
             <a:endParaRPr lang="pt-BR"/>
           </a:p>
@@ -2847,7 +2857,7 @@
             <a:fld id="{6B2AED99-3A78-46C3-A4E3-29F86B3E5DC3}" type="datetimeFigureOut">
               <a:rPr lang="pt-BR" smtClean="0"/>
               <a:pPr/>
-              <a:t>2/10/2014</a:t>
+              <a:t>6/10/2014</a:t>
             </a:fld>
             <a:endParaRPr lang="pt-BR"/>
           </a:p>
@@ -3253,7 +3263,7 @@
             <a:fld id="{6B2AED99-3A78-46C3-A4E3-29F86B3E5DC3}" type="datetimeFigureOut">
               <a:rPr lang="pt-BR" smtClean="0"/>
               <a:pPr/>
-              <a:t>2/10/2014</a:t>
+              <a:t>6/10/2014</a:t>
             </a:fld>
             <a:endParaRPr lang="pt-BR"/>
           </a:p>
@@ -4316,6 +4326,980 @@
 </p:sld>
 </file>
 
+<file path=ppt/slides/slide15.xml><?xml version="1.0" encoding="utf-8"?>
+<p:sld xmlns:a="http://schemas.openxmlformats.org/drawingml/2006/main" xmlns:r="http://schemas.openxmlformats.org/officeDocument/2006/relationships" xmlns:p="http://schemas.openxmlformats.org/presentationml/2006/main">
+  <p:cSld>
+    <p:spTree>
+      <p:nvGrpSpPr>
+        <p:cNvPr id="1" name=""/>
+        <p:cNvGrpSpPr/>
+        <p:nvPr/>
+      </p:nvGrpSpPr>
+      <p:grpSpPr>
+        <a:xfrm>
+          <a:off x="0" y="0"/>
+          <a:ext cx="0" cy="0"/>
+          <a:chOff x="0" y="0"/>
+          <a:chExt cx="0" cy="0"/>
+        </a:xfrm>
+      </p:grpSpPr>
+      <p:sp>
+        <p:nvSpPr>
+          <p:cNvPr id="2" name="Título 1"/>
+          <p:cNvSpPr>
+            <a:spLocks noGrp="1"/>
+          </p:cNvSpPr>
+          <p:nvPr>
+            <p:ph type="title"/>
+          </p:nvPr>
+        </p:nvSpPr>
+        <p:spPr/>
+        <p:txBody>
+          <a:bodyPr/>
+          <a:lstStyle/>
+          <a:p>
+            <a:r>
+              <a:rPr lang="pt-BR" dirty="0" smtClean="0"/>
+              <a:t>Ordenação</a:t>
+            </a:r>
+            <a:endParaRPr lang="pt-BR" dirty="0"/>
+          </a:p>
+        </p:txBody>
+      </p:sp>
+      <p:sp>
+        <p:nvSpPr>
+          <p:cNvPr id="3" name="Espaço Reservado para Conteúdo 2"/>
+          <p:cNvSpPr>
+            <a:spLocks noGrp="1"/>
+          </p:cNvSpPr>
+          <p:nvPr>
+            <p:ph idx="1"/>
+          </p:nvPr>
+        </p:nvSpPr>
+        <p:spPr/>
+        <p:txBody>
+          <a:bodyPr>
+            <a:normAutofit lnSpcReduction="10000"/>
+          </a:bodyPr>
+          <a:lstStyle/>
+          <a:p>
+            <a:r>
+              <a:rPr lang="pt-BR" dirty="0" smtClean="0">
+                <a:solidFill>
+                  <a:srgbClr val="92D050"/>
+                </a:solidFill>
+              </a:rPr>
+              <a:t>Ordenar</a:t>
+            </a:r>
+            <a:r>
+              <a:rPr lang="pt-BR" dirty="0" smtClean="0"/>
+              <a:t> os elementos de um vetor significa permutá-los ou rearranjá-los de tal modo que eles fiquem em </a:t>
+            </a:r>
+            <a:r>
+              <a:rPr lang="pt-BR" dirty="0" smtClean="0">
+                <a:solidFill>
+                  <a:srgbClr val="92D050"/>
+                </a:solidFill>
+              </a:rPr>
+              <a:t>ordem crescente</a:t>
+            </a:r>
+          </a:p>
+          <a:p>
+            <a:r>
+              <a:rPr lang="pt-BR" dirty="0" smtClean="0"/>
+              <a:t>Existem </a:t>
+            </a:r>
+            <a:r>
+              <a:rPr lang="pt-BR" dirty="0" smtClean="0">
+                <a:solidFill>
+                  <a:srgbClr val="92D050"/>
+                </a:solidFill>
+              </a:rPr>
+              <a:t>vários algoritmos</a:t>
+            </a:r>
+            <a:r>
+              <a:rPr lang="pt-BR" dirty="0" smtClean="0"/>
+              <a:t> para essa tarefa, cada um com suas particularidades</a:t>
+            </a:r>
+          </a:p>
+          <a:p>
+            <a:r>
+              <a:rPr lang="pt-BR" dirty="0" smtClean="0"/>
+              <a:t>Em casos genéricos, escolhemos o melhor algoritmo se ele </a:t>
+            </a:r>
+            <a:r>
+              <a:rPr lang="pt-BR" dirty="0" smtClean="0">
+                <a:solidFill>
+                  <a:srgbClr val="92D050"/>
+                </a:solidFill>
+              </a:rPr>
+              <a:t>ordenar mais rápido</a:t>
+            </a:r>
+            <a:endParaRPr lang="pt-BR" dirty="0">
+              <a:solidFill>
+                <a:srgbClr val="92D050"/>
+              </a:solidFill>
+            </a:endParaRPr>
+          </a:p>
+        </p:txBody>
+      </p:sp>
+    </p:spTree>
+  </p:cSld>
+  <p:clrMapOvr>
+    <a:masterClrMapping/>
+  </p:clrMapOvr>
+</p:sld>
+</file>
+
+<file path=ppt/slides/slide16.xml><?xml version="1.0" encoding="utf-8"?>
+<p:sld xmlns:a="http://schemas.openxmlformats.org/drawingml/2006/main" xmlns:r="http://schemas.openxmlformats.org/officeDocument/2006/relationships" xmlns:p="http://schemas.openxmlformats.org/presentationml/2006/main">
+  <p:cSld>
+    <p:spTree>
+      <p:nvGrpSpPr>
+        <p:cNvPr id="1" name=""/>
+        <p:cNvGrpSpPr/>
+        <p:nvPr/>
+      </p:nvGrpSpPr>
+      <p:grpSpPr>
+        <a:xfrm>
+          <a:off x="0" y="0"/>
+          <a:ext cx="0" cy="0"/>
+          <a:chOff x="0" y="0"/>
+          <a:chExt cx="0" cy="0"/>
+        </a:xfrm>
+      </p:grpSpPr>
+      <p:sp>
+        <p:nvSpPr>
+          <p:cNvPr id="2" name="Título 1"/>
+          <p:cNvSpPr>
+            <a:spLocks noGrp="1"/>
+          </p:cNvSpPr>
+          <p:nvPr>
+            <p:ph type="title"/>
+          </p:nvPr>
+        </p:nvSpPr>
+        <p:spPr/>
+        <p:txBody>
+          <a:bodyPr/>
+          <a:lstStyle/>
+          <a:p>
+            <a:r>
+              <a:rPr lang="pt-BR" dirty="0" smtClean="0"/>
+              <a:t>Ordenação</a:t>
+            </a:r>
+            <a:endParaRPr lang="pt-BR" dirty="0"/>
+          </a:p>
+        </p:txBody>
+      </p:sp>
+      <p:sp>
+        <p:nvSpPr>
+          <p:cNvPr id="3" name="Espaço Reservado para Conteúdo 2"/>
+          <p:cNvSpPr>
+            <a:spLocks noGrp="1"/>
+          </p:cNvSpPr>
+          <p:nvPr>
+            <p:ph idx="1"/>
+          </p:nvPr>
+        </p:nvSpPr>
+        <p:spPr/>
+        <p:txBody>
+          <a:bodyPr>
+            <a:normAutofit lnSpcReduction="10000"/>
+          </a:bodyPr>
+          <a:lstStyle/>
+          <a:p>
+            <a:r>
+              <a:rPr lang="pt-BR" dirty="0" smtClean="0"/>
+              <a:t>Exemplos de algoritmos:</a:t>
+            </a:r>
+          </a:p>
+          <a:p>
+            <a:pPr lvl="1"/>
+            <a:r>
+              <a:rPr lang="pt-BR" dirty="0" err="1" smtClean="0"/>
+              <a:t>Insertion</a:t>
+            </a:r>
+            <a:r>
+              <a:rPr lang="pt-BR" dirty="0" smtClean="0"/>
+              <a:t> </a:t>
+            </a:r>
+            <a:r>
+              <a:rPr lang="pt-BR" dirty="0" err="1" smtClean="0"/>
+              <a:t>Sort</a:t>
+            </a:r>
+            <a:r>
+              <a:rPr lang="pt-BR" dirty="0" smtClean="0"/>
+              <a:t> (inserção)</a:t>
+            </a:r>
+          </a:p>
+          <a:p>
+            <a:pPr lvl="1"/>
+            <a:r>
+              <a:rPr lang="pt-BR" dirty="0" err="1" smtClean="0"/>
+              <a:t>Selection</a:t>
+            </a:r>
+            <a:r>
+              <a:rPr lang="pt-BR" dirty="0" smtClean="0"/>
+              <a:t> </a:t>
+            </a:r>
+            <a:r>
+              <a:rPr lang="pt-BR" dirty="0" err="1" smtClean="0"/>
+              <a:t>Sort</a:t>
+            </a:r>
+            <a:r>
+              <a:rPr lang="pt-BR" dirty="0" smtClean="0"/>
+              <a:t> (seleção)</a:t>
+            </a:r>
+          </a:p>
+          <a:p>
+            <a:pPr lvl="1"/>
+            <a:r>
+              <a:rPr lang="pt-BR" dirty="0" err="1" smtClean="0"/>
+              <a:t>Bubble</a:t>
+            </a:r>
+            <a:r>
+              <a:rPr lang="pt-BR" dirty="0" smtClean="0"/>
+              <a:t> </a:t>
+            </a:r>
+            <a:r>
+              <a:rPr lang="pt-BR" dirty="0" err="1" smtClean="0"/>
+              <a:t>Sort</a:t>
+            </a:r>
+            <a:r>
+              <a:rPr lang="pt-BR" dirty="0" smtClean="0"/>
+              <a:t> (bolha)</a:t>
+            </a:r>
+          </a:p>
+          <a:p>
+            <a:pPr lvl="1"/>
+            <a:r>
+              <a:rPr lang="pt-BR" dirty="0" smtClean="0"/>
+              <a:t>Shell </a:t>
+            </a:r>
+            <a:r>
+              <a:rPr lang="pt-BR" dirty="0" err="1" smtClean="0"/>
+              <a:t>Sort</a:t>
+            </a:r>
+            <a:r>
+              <a:rPr lang="pt-BR" dirty="0" smtClean="0"/>
+              <a:t> (concha)</a:t>
+            </a:r>
+          </a:p>
+          <a:p>
+            <a:pPr lvl="1"/>
+            <a:r>
+              <a:rPr lang="pt-BR" dirty="0" smtClean="0"/>
+              <a:t>Merge </a:t>
+            </a:r>
+            <a:r>
+              <a:rPr lang="pt-BR" dirty="0" err="1" smtClean="0"/>
+              <a:t>Sort</a:t>
+            </a:r>
+            <a:r>
+              <a:rPr lang="pt-BR" dirty="0" smtClean="0"/>
+              <a:t> (união)</a:t>
+            </a:r>
+          </a:p>
+          <a:p>
+            <a:pPr lvl="1"/>
+            <a:r>
+              <a:rPr lang="pt-BR" dirty="0" err="1" smtClean="0"/>
+              <a:t>Heap</a:t>
+            </a:r>
+            <a:r>
+              <a:rPr lang="pt-BR" dirty="0" smtClean="0"/>
+              <a:t> </a:t>
+            </a:r>
+            <a:r>
+              <a:rPr lang="pt-BR" dirty="0" err="1" smtClean="0"/>
+              <a:t>Sort</a:t>
+            </a:r>
+            <a:r>
+              <a:rPr lang="pt-BR" dirty="0" smtClean="0"/>
+              <a:t> (pilha)</a:t>
+            </a:r>
+          </a:p>
+          <a:p>
+            <a:pPr lvl="1"/>
+            <a:r>
+              <a:rPr lang="pt-BR" dirty="0" err="1" smtClean="0"/>
+              <a:t>Quick</a:t>
+            </a:r>
+            <a:r>
+              <a:rPr lang="pt-BR" dirty="0" smtClean="0"/>
+              <a:t> </a:t>
+            </a:r>
+            <a:r>
+              <a:rPr lang="pt-BR" dirty="0" err="1" smtClean="0"/>
+              <a:t>Sort</a:t>
+            </a:r>
+            <a:r>
+              <a:rPr lang="pt-BR" dirty="0" smtClean="0"/>
+              <a:t> (rápido)</a:t>
+            </a:r>
+          </a:p>
+          <a:p>
+            <a:r>
+              <a:rPr lang="pt-BR" dirty="0" smtClean="0"/>
+              <a:t>Visualização em </a:t>
+            </a:r>
+            <a:r>
+              <a:rPr lang="pt-BR" dirty="0" smtClean="0">
+                <a:solidFill>
+                  <a:srgbClr val="92D050"/>
+                </a:solidFill>
+              </a:rPr>
+              <a:t>http://</a:t>
+            </a:r>
+            <a:r>
+              <a:rPr lang="pt-BR" dirty="0" smtClean="0">
+                <a:solidFill>
+                  <a:srgbClr val="92D050"/>
+                </a:solidFill>
+              </a:rPr>
+              <a:t>www.sorting-algorithms.com</a:t>
+            </a:r>
+          </a:p>
+        </p:txBody>
+      </p:sp>
+    </p:spTree>
+  </p:cSld>
+  <p:clrMapOvr>
+    <a:masterClrMapping/>
+  </p:clrMapOvr>
+</p:sld>
+</file>
+
+<file path=ppt/slides/slide17.xml><?xml version="1.0" encoding="utf-8"?>
+<p:sld xmlns:a="http://schemas.openxmlformats.org/drawingml/2006/main" xmlns:r="http://schemas.openxmlformats.org/officeDocument/2006/relationships" xmlns:p="http://schemas.openxmlformats.org/presentationml/2006/main">
+  <p:cSld>
+    <p:spTree>
+      <p:nvGrpSpPr>
+        <p:cNvPr id="1" name=""/>
+        <p:cNvGrpSpPr/>
+        <p:nvPr/>
+      </p:nvGrpSpPr>
+      <p:grpSpPr>
+        <a:xfrm>
+          <a:off x="0" y="0"/>
+          <a:ext cx="0" cy="0"/>
+          <a:chOff x="0" y="0"/>
+          <a:chExt cx="0" cy="0"/>
+        </a:xfrm>
+      </p:grpSpPr>
+      <p:sp>
+        <p:nvSpPr>
+          <p:cNvPr id="2" name="Título 1"/>
+          <p:cNvSpPr>
+            <a:spLocks noGrp="1"/>
+          </p:cNvSpPr>
+          <p:nvPr>
+            <p:ph type="title"/>
+          </p:nvPr>
+        </p:nvSpPr>
+        <p:spPr/>
+        <p:txBody>
+          <a:bodyPr/>
+          <a:lstStyle/>
+          <a:p>
+            <a:r>
+              <a:rPr lang="pt-BR" dirty="0" smtClean="0"/>
+              <a:t>Vetores Dinâmicos</a:t>
+            </a:r>
+            <a:endParaRPr lang="pt-BR" dirty="0"/>
+          </a:p>
+        </p:txBody>
+      </p:sp>
+      <p:sp>
+        <p:nvSpPr>
+          <p:cNvPr id="3" name="Espaço Reservado para Conteúdo 2"/>
+          <p:cNvSpPr>
+            <a:spLocks noGrp="1"/>
+          </p:cNvSpPr>
+          <p:nvPr>
+            <p:ph idx="1"/>
+          </p:nvPr>
+        </p:nvSpPr>
+        <p:spPr/>
+        <p:txBody>
+          <a:bodyPr>
+            <a:normAutofit fontScale="92500"/>
+          </a:bodyPr>
+          <a:lstStyle/>
+          <a:p>
+            <a:r>
+              <a:rPr lang="pt-BR" dirty="0" smtClean="0"/>
+              <a:t>Uma das grandes vantagens do C# são os </a:t>
+            </a:r>
+            <a:r>
+              <a:rPr lang="pt-BR" dirty="0" smtClean="0">
+                <a:solidFill>
+                  <a:srgbClr val="92D050"/>
+                </a:solidFill>
+              </a:rPr>
+              <a:t>vetores dinâmicos</a:t>
+            </a:r>
+          </a:p>
+          <a:p>
+            <a:r>
+              <a:rPr lang="pt-BR" dirty="0" smtClean="0"/>
+              <a:t>Você não precisa conhecer o número de elementos</a:t>
+            </a:r>
+          </a:p>
+          <a:p>
+            <a:r>
+              <a:rPr lang="pt-BR" dirty="0" smtClean="0"/>
+              <a:t>Possuem </a:t>
+            </a:r>
+            <a:r>
+              <a:rPr lang="pt-BR" dirty="0" smtClean="0"/>
+              <a:t>muitas operações </a:t>
+            </a:r>
+            <a:r>
+              <a:rPr lang="pt-BR" dirty="0" smtClean="0"/>
+              <a:t>prontas</a:t>
+            </a:r>
+          </a:p>
+          <a:p>
+            <a:r>
+              <a:rPr lang="pt-BR" dirty="0" smtClean="0"/>
+              <a:t>Estrutura </a:t>
+            </a:r>
+            <a:r>
+              <a:rPr lang="pt-BR" dirty="0" smtClean="0">
+                <a:solidFill>
+                  <a:srgbClr val="92D050"/>
+                </a:solidFill>
+              </a:rPr>
+              <a:t>auto-gerenciáveis</a:t>
+            </a:r>
+            <a:r>
+              <a:rPr lang="pt-BR" dirty="0" smtClean="0"/>
+              <a:t> que na prática substituem os vetores estáticos</a:t>
+            </a:r>
+          </a:p>
+          <a:p>
+            <a:r>
+              <a:rPr lang="pt-BR" dirty="0" smtClean="0"/>
+              <a:t>Porém, tendem a ser </a:t>
+            </a:r>
+            <a:r>
+              <a:rPr lang="pt-BR" dirty="0" smtClean="0">
+                <a:solidFill>
+                  <a:srgbClr val="92D050"/>
+                </a:solidFill>
+              </a:rPr>
+              <a:t>mais lentos</a:t>
+            </a:r>
+            <a:r>
+              <a:rPr lang="pt-BR" dirty="0" smtClean="0"/>
+              <a:t> e ocupar </a:t>
+            </a:r>
+            <a:r>
+              <a:rPr lang="pt-BR" dirty="0" smtClean="0">
+                <a:solidFill>
+                  <a:srgbClr val="92D050"/>
+                </a:solidFill>
+              </a:rPr>
+              <a:t>mais memória</a:t>
+            </a:r>
+            <a:r>
+              <a:rPr lang="pt-BR" dirty="0" smtClean="0"/>
+              <a:t> do que os vetores estáticos</a:t>
+            </a:r>
+            <a:endParaRPr lang="pt-BR" dirty="0"/>
+          </a:p>
+        </p:txBody>
+      </p:sp>
+    </p:spTree>
+  </p:cSld>
+  <p:clrMapOvr>
+    <a:masterClrMapping/>
+  </p:clrMapOvr>
+</p:sld>
+</file>
+
+<file path=ppt/slides/slide18.xml><?xml version="1.0" encoding="utf-8"?>
+<p:sld xmlns:a="http://schemas.openxmlformats.org/drawingml/2006/main" xmlns:r="http://schemas.openxmlformats.org/officeDocument/2006/relationships" xmlns:p="http://schemas.openxmlformats.org/presentationml/2006/main">
+  <p:cSld>
+    <p:spTree>
+      <p:nvGrpSpPr>
+        <p:cNvPr id="1" name=""/>
+        <p:cNvGrpSpPr/>
+        <p:nvPr/>
+      </p:nvGrpSpPr>
+      <p:grpSpPr>
+        <a:xfrm>
+          <a:off x="0" y="0"/>
+          <a:ext cx="0" cy="0"/>
+          <a:chOff x="0" y="0"/>
+          <a:chExt cx="0" cy="0"/>
+        </a:xfrm>
+      </p:grpSpPr>
+      <p:sp>
+        <p:nvSpPr>
+          <p:cNvPr id="2" name="Título 1"/>
+          <p:cNvSpPr>
+            <a:spLocks noGrp="1"/>
+          </p:cNvSpPr>
+          <p:nvPr>
+            <p:ph type="title"/>
+          </p:nvPr>
+        </p:nvSpPr>
+        <p:spPr/>
+        <p:txBody>
+          <a:bodyPr/>
+          <a:lstStyle/>
+          <a:p>
+            <a:r>
+              <a:rPr lang="pt-BR" dirty="0" err="1" smtClean="0"/>
+              <a:t>ArrayList</a:t>
+            </a:r>
+            <a:endParaRPr lang="pt-BR" dirty="0"/>
+          </a:p>
+        </p:txBody>
+      </p:sp>
+      <p:sp>
+        <p:nvSpPr>
+          <p:cNvPr id="3" name="Espaço Reservado para Conteúdo 2"/>
+          <p:cNvSpPr>
+            <a:spLocks noGrp="1"/>
+          </p:cNvSpPr>
+          <p:nvPr>
+            <p:ph idx="1"/>
+          </p:nvPr>
+        </p:nvSpPr>
+        <p:spPr/>
+        <p:txBody>
+          <a:bodyPr/>
+          <a:lstStyle/>
+          <a:p>
+            <a:r>
+              <a:rPr lang="pt-BR" dirty="0" smtClean="0"/>
+              <a:t>Classe </a:t>
+            </a:r>
+            <a:r>
+              <a:rPr lang="pt-BR" b="1" dirty="0" err="1" smtClean="0">
+                <a:solidFill>
+                  <a:srgbClr val="92D050"/>
+                </a:solidFill>
+                <a:latin typeface="Courier New" pitchFamily="49" charset="0"/>
+                <a:cs typeface="Courier New" pitchFamily="49" charset="0"/>
+              </a:rPr>
+              <a:t>ArrayList</a:t>
+            </a:r>
+            <a:r>
+              <a:rPr lang="pt-BR" dirty="0" smtClean="0"/>
+              <a:t> que está no </a:t>
+            </a:r>
+            <a:r>
+              <a:rPr lang="pt-BR" dirty="0" err="1" smtClean="0"/>
+              <a:t>namespace</a:t>
+            </a:r>
+            <a:r>
+              <a:rPr lang="pt-BR" dirty="0" smtClean="0"/>
+              <a:t> </a:t>
+            </a:r>
+            <a:r>
+              <a:rPr lang="pt-BR" b="1" dirty="0" smtClean="0">
+                <a:solidFill>
+                  <a:srgbClr val="92D050"/>
+                </a:solidFill>
+                <a:latin typeface="Courier New" pitchFamily="49" charset="0"/>
+                <a:cs typeface="Courier New" pitchFamily="49" charset="0"/>
+              </a:rPr>
+              <a:t>System.</a:t>
+            </a:r>
+            <a:r>
+              <a:rPr lang="pt-BR" b="1" dirty="0" err="1" smtClean="0">
+                <a:solidFill>
+                  <a:srgbClr val="92D050"/>
+                </a:solidFill>
+                <a:latin typeface="Courier New" pitchFamily="49" charset="0"/>
+                <a:cs typeface="Courier New" pitchFamily="49" charset="0"/>
+              </a:rPr>
+              <a:t>Collections</a:t>
+            </a:r>
+            <a:endParaRPr lang="pt-BR" b="1" dirty="0" smtClean="0">
+              <a:solidFill>
+                <a:srgbClr val="92D050"/>
+              </a:solidFill>
+              <a:latin typeface="Courier New" pitchFamily="49" charset="0"/>
+              <a:cs typeface="Courier New" pitchFamily="49" charset="0"/>
+            </a:endParaRPr>
+          </a:p>
+          <a:p>
+            <a:r>
+              <a:rPr lang="pt-BR" dirty="0" smtClean="0"/>
+              <a:t>Pode ser declarado de duas formas:</a:t>
+            </a:r>
+          </a:p>
+          <a:p>
+            <a:pPr lvl="1"/>
+            <a:r>
+              <a:rPr lang="pt-BR" b="1" dirty="0" smtClean="0">
+                <a:latin typeface="Courier New" pitchFamily="49" charset="0"/>
+                <a:cs typeface="Courier New" pitchFamily="49" charset="0"/>
+              </a:rPr>
+              <a:t>System.</a:t>
+            </a:r>
+            <a:r>
+              <a:rPr lang="pt-BR" b="1" dirty="0" err="1" smtClean="0">
+                <a:latin typeface="Courier New" pitchFamily="49" charset="0"/>
+                <a:cs typeface="Courier New" pitchFamily="49" charset="0"/>
+              </a:rPr>
+              <a:t>Collections</a:t>
+            </a:r>
+            <a:r>
+              <a:rPr lang="pt-BR" b="1" dirty="0" smtClean="0">
+                <a:latin typeface="Courier New" pitchFamily="49" charset="0"/>
+                <a:cs typeface="Courier New" pitchFamily="49" charset="0"/>
+              </a:rPr>
+              <a:t>.</a:t>
+            </a:r>
+            <a:r>
+              <a:rPr lang="pt-BR" b="1" dirty="0" err="1" smtClean="0">
+                <a:latin typeface="Courier New" pitchFamily="49" charset="0"/>
+                <a:cs typeface="Courier New" pitchFamily="49" charset="0"/>
+              </a:rPr>
+              <a:t>ArrayList</a:t>
+            </a:r>
+            <a:r>
+              <a:rPr lang="pt-BR" b="1" dirty="0" smtClean="0">
+                <a:latin typeface="Courier New" pitchFamily="49" charset="0"/>
+                <a:cs typeface="Courier New" pitchFamily="49" charset="0"/>
+              </a:rPr>
+              <a:t> </a:t>
+            </a:r>
+            <a:r>
+              <a:rPr lang="pt-BR" b="1" dirty="0" err="1" smtClean="0">
+                <a:latin typeface="Courier New" pitchFamily="49" charset="0"/>
+                <a:cs typeface="Courier New" pitchFamily="49" charset="0"/>
+              </a:rPr>
+              <a:t>dinamico</a:t>
+            </a:r>
+            <a:r>
+              <a:rPr lang="pt-BR" b="1" dirty="0" smtClean="0">
+                <a:latin typeface="Courier New" pitchFamily="49" charset="0"/>
+                <a:cs typeface="Courier New" pitchFamily="49" charset="0"/>
+              </a:rPr>
+              <a:t>;</a:t>
+            </a:r>
+          </a:p>
+          <a:p>
+            <a:r>
+              <a:rPr lang="pt-BR" dirty="0" smtClean="0"/>
+              <a:t>Ou</a:t>
+            </a:r>
+          </a:p>
+          <a:p>
+            <a:pPr lvl="1"/>
+            <a:r>
+              <a:rPr lang="pt-BR" b="1" dirty="0" err="1" smtClean="0">
+                <a:latin typeface="Courier New" pitchFamily="49" charset="0"/>
+                <a:cs typeface="Courier New" pitchFamily="49" charset="0"/>
+              </a:rPr>
+              <a:t>u</a:t>
+            </a:r>
+            <a:r>
+              <a:rPr lang="pt-BR" b="1" dirty="0" err="1" smtClean="0">
+                <a:latin typeface="Courier New" pitchFamily="49" charset="0"/>
+                <a:cs typeface="Courier New" pitchFamily="49" charset="0"/>
+              </a:rPr>
+              <a:t>sing</a:t>
+            </a:r>
+            <a:r>
+              <a:rPr lang="pt-BR" b="1" dirty="0" smtClean="0">
+                <a:latin typeface="Courier New" pitchFamily="49" charset="0"/>
+                <a:cs typeface="Courier New" pitchFamily="49" charset="0"/>
+              </a:rPr>
+              <a:t> System.</a:t>
+            </a:r>
+            <a:r>
+              <a:rPr lang="pt-BR" b="1" dirty="0" err="1" smtClean="0">
+                <a:latin typeface="Courier New" pitchFamily="49" charset="0"/>
+                <a:cs typeface="Courier New" pitchFamily="49" charset="0"/>
+              </a:rPr>
+              <a:t>Collections</a:t>
+            </a:r>
+            <a:r>
+              <a:rPr lang="pt-BR" b="1" dirty="0" smtClean="0">
+                <a:latin typeface="Courier New" pitchFamily="49" charset="0"/>
+                <a:cs typeface="Courier New" pitchFamily="49" charset="0"/>
+              </a:rPr>
+              <a:t>;</a:t>
+            </a:r>
+          </a:p>
+          <a:p>
+            <a:pPr lvl="1"/>
+            <a:r>
+              <a:rPr lang="pt-BR" b="1" dirty="0" smtClean="0">
+                <a:latin typeface="Courier New" pitchFamily="49" charset="0"/>
+                <a:cs typeface="Courier New" pitchFamily="49" charset="0"/>
+              </a:rPr>
+              <a:t>...</a:t>
+            </a:r>
+          </a:p>
+          <a:p>
+            <a:pPr lvl="1"/>
+            <a:r>
+              <a:rPr lang="pt-BR" b="1" dirty="0" err="1" smtClean="0">
+                <a:latin typeface="Courier New" pitchFamily="49" charset="0"/>
+                <a:cs typeface="Courier New" pitchFamily="49" charset="0"/>
+              </a:rPr>
+              <a:t>ArrayList</a:t>
+            </a:r>
+            <a:r>
+              <a:rPr lang="pt-BR" b="1" dirty="0" smtClean="0">
+                <a:latin typeface="Courier New" pitchFamily="49" charset="0"/>
+                <a:cs typeface="Courier New" pitchFamily="49" charset="0"/>
+              </a:rPr>
+              <a:t> </a:t>
+            </a:r>
+            <a:r>
+              <a:rPr lang="pt-BR" b="1" dirty="0" err="1" smtClean="0">
+                <a:latin typeface="Courier New" pitchFamily="49" charset="0"/>
+                <a:cs typeface="Courier New" pitchFamily="49" charset="0"/>
+              </a:rPr>
+              <a:t>dinamico</a:t>
+            </a:r>
+            <a:r>
+              <a:rPr lang="pt-BR" b="1" dirty="0" smtClean="0">
+                <a:latin typeface="Courier New" pitchFamily="49" charset="0"/>
+                <a:cs typeface="Courier New" pitchFamily="49" charset="0"/>
+              </a:rPr>
+              <a:t>;</a:t>
+            </a:r>
+          </a:p>
+        </p:txBody>
+      </p:sp>
+    </p:spTree>
+  </p:cSld>
+  <p:clrMapOvr>
+    <a:masterClrMapping/>
+  </p:clrMapOvr>
+</p:sld>
+</file>
+
+<file path=ppt/slides/slide19.xml><?xml version="1.0" encoding="utf-8"?>
+<p:sld xmlns:a="http://schemas.openxmlformats.org/drawingml/2006/main" xmlns:r="http://schemas.openxmlformats.org/officeDocument/2006/relationships" xmlns:p="http://schemas.openxmlformats.org/presentationml/2006/main">
+  <p:cSld>
+    <p:spTree>
+      <p:nvGrpSpPr>
+        <p:cNvPr id="1" name=""/>
+        <p:cNvGrpSpPr/>
+        <p:nvPr/>
+      </p:nvGrpSpPr>
+      <p:grpSpPr>
+        <a:xfrm>
+          <a:off x="0" y="0"/>
+          <a:ext cx="0" cy="0"/>
+          <a:chOff x="0" y="0"/>
+          <a:chExt cx="0" cy="0"/>
+        </a:xfrm>
+      </p:grpSpPr>
+      <p:sp>
+        <p:nvSpPr>
+          <p:cNvPr id="2" name="Título 1"/>
+          <p:cNvSpPr>
+            <a:spLocks noGrp="1"/>
+          </p:cNvSpPr>
+          <p:nvPr>
+            <p:ph type="title"/>
+          </p:nvPr>
+        </p:nvSpPr>
+        <p:spPr/>
+        <p:txBody>
+          <a:bodyPr/>
+          <a:lstStyle/>
+          <a:p>
+            <a:r>
+              <a:rPr lang="pt-BR" dirty="0" err="1" smtClean="0"/>
+              <a:t>ArrayList</a:t>
+            </a:r>
+            <a:endParaRPr lang="pt-BR" dirty="0"/>
+          </a:p>
+        </p:txBody>
+      </p:sp>
+      <p:sp>
+        <p:nvSpPr>
+          <p:cNvPr id="3" name="Espaço Reservado para Conteúdo 2"/>
+          <p:cNvSpPr>
+            <a:spLocks noGrp="1"/>
+          </p:cNvSpPr>
+          <p:nvPr>
+            <p:ph idx="1"/>
+          </p:nvPr>
+        </p:nvSpPr>
+        <p:spPr/>
+        <p:txBody>
+          <a:bodyPr/>
+          <a:lstStyle/>
+          <a:p>
+            <a:r>
+              <a:rPr lang="pt-BR" dirty="0" smtClean="0"/>
+              <a:t>O </a:t>
+            </a:r>
+            <a:r>
+              <a:rPr lang="pt-BR" dirty="0" err="1" smtClean="0"/>
+              <a:t>ArrayList</a:t>
+            </a:r>
+            <a:r>
+              <a:rPr lang="pt-BR" dirty="0" smtClean="0"/>
+              <a:t> funciona bem com tipos básicos:</a:t>
+            </a:r>
+          </a:p>
+          <a:p>
+            <a:pPr lvl="1"/>
+            <a:r>
+              <a:rPr lang="pt-BR" b="1" dirty="0" err="1" smtClean="0">
+                <a:latin typeface="Courier New" pitchFamily="49" charset="0"/>
+                <a:cs typeface="Courier New" pitchFamily="49" charset="0"/>
+              </a:rPr>
+              <a:t>int</a:t>
+            </a:r>
+            <a:r>
+              <a:rPr lang="pt-BR" b="1" dirty="0" smtClean="0">
+                <a:latin typeface="Courier New" pitchFamily="49" charset="0"/>
+                <a:cs typeface="Courier New" pitchFamily="49" charset="0"/>
+              </a:rPr>
+              <a:t>, </a:t>
+            </a:r>
+            <a:r>
+              <a:rPr lang="pt-BR" b="1" dirty="0" err="1" smtClean="0">
+                <a:latin typeface="Courier New" pitchFamily="49" charset="0"/>
+                <a:cs typeface="Courier New" pitchFamily="49" charset="0"/>
+              </a:rPr>
+              <a:t>bool</a:t>
+            </a:r>
+            <a:r>
+              <a:rPr lang="pt-BR" b="1" dirty="0" smtClean="0">
+                <a:latin typeface="Courier New" pitchFamily="49" charset="0"/>
+                <a:cs typeface="Courier New" pitchFamily="49" charset="0"/>
+              </a:rPr>
+              <a:t>, </a:t>
+            </a:r>
+            <a:r>
+              <a:rPr lang="pt-BR" b="1" dirty="0" err="1" smtClean="0">
+                <a:latin typeface="Courier New" pitchFamily="49" charset="0"/>
+                <a:cs typeface="Courier New" pitchFamily="49" charset="0"/>
+              </a:rPr>
+              <a:t>double</a:t>
+            </a:r>
+            <a:r>
+              <a:rPr lang="pt-BR" b="1" dirty="0" smtClean="0">
+                <a:latin typeface="Courier New" pitchFamily="49" charset="0"/>
+                <a:cs typeface="Courier New" pitchFamily="49" charset="0"/>
+              </a:rPr>
+              <a:t>, </a:t>
+            </a:r>
+            <a:r>
+              <a:rPr lang="pt-BR" b="1" dirty="0" err="1" smtClean="0">
+                <a:latin typeface="Courier New" pitchFamily="49" charset="0"/>
+                <a:cs typeface="Courier New" pitchFamily="49" charset="0"/>
+              </a:rPr>
+              <a:t>float</a:t>
+            </a:r>
+            <a:r>
+              <a:rPr lang="pt-BR" b="1" dirty="0" smtClean="0">
+                <a:latin typeface="Courier New" pitchFamily="49" charset="0"/>
+                <a:cs typeface="Courier New" pitchFamily="49" charset="0"/>
+              </a:rPr>
+              <a:t>, string</a:t>
+            </a:r>
+          </a:p>
+          <a:p>
+            <a:r>
+              <a:rPr lang="pt-BR" dirty="0" smtClean="0"/>
+              <a:t>Para tipos complexos, é necessário o uso de </a:t>
+            </a:r>
+            <a:r>
+              <a:rPr lang="pt-BR" dirty="0" err="1" smtClean="0">
+                <a:solidFill>
+                  <a:srgbClr val="92D050"/>
+                </a:solidFill>
+              </a:rPr>
+              <a:t>cast</a:t>
+            </a:r>
+            <a:endParaRPr lang="pt-BR" dirty="0" smtClean="0">
+              <a:solidFill>
+                <a:srgbClr val="92D050"/>
+              </a:solidFill>
+            </a:endParaRPr>
+          </a:p>
+          <a:p>
+            <a:r>
+              <a:rPr lang="pt-BR" dirty="0" smtClean="0"/>
+              <a:t>Após ser declarado, precisa ser </a:t>
+            </a:r>
+            <a:r>
+              <a:rPr lang="pt-BR" dirty="0" smtClean="0">
+                <a:solidFill>
+                  <a:srgbClr val="92D050"/>
+                </a:solidFill>
+              </a:rPr>
+              <a:t>instanciado</a:t>
+            </a:r>
+            <a:r>
+              <a:rPr lang="pt-BR" dirty="0" smtClean="0"/>
+              <a:t>:</a:t>
+            </a:r>
+          </a:p>
+          <a:p>
+            <a:pPr lvl="1"/>
+            <a:r>
+              <a:rPr lang="pt-BR" b="1" dirty="0" err="1" smtClean="0">
+                <a:latin typeface="Courier New" pitchFamily="49" charset="0"/>
+                <a:cs typeface="Courier New" pitchFamily="49" charset="0"/>
+              </a:rPr>
+              <a:t>dinamico</a:t>
+            </a:r>
+            <a:r>
+              <a:rPr lang="pt-BR" b="1" dirty="0" smtClean="0">
+                <a:latin typeface="Courier New" pitchFamily="49" charset="0"/>
+                <a:cs typeface="Courier New" pitchFamily="49" charset="0"/>
+              </a:rPr>
+              <a:t> = </a:t>
+            </a:r>
+            <a:r>
+              <a:rPr lang="pt-BR" b="1" dirty="0" err="1" smtClean="0">
+                <a:latin typeface="Courier New" pitchFamily="49" charset="0"/>
+                <a:cs typeface="Courier New" pitchFamily="49" charset="0"/>
+              </a:rPr>
+              <a:t>new</a:t>
+            </a:r>
+            <a:r>
+              <a:rPr lang="pt-BR" b="1" dirty="0" smtClean="0">
+                <a:latin typeface="Courier New" pitchFamily="49" charset="0"/>
+                <a:cs typeface="Courier New" pitchFamily="49" charset="0"/>
+              </a:rPr>
+              <a:t> </a:t>
+            </a:r>
+            <a:r>
+              <a:rPr lang="pt-BR" b="1" dirty="0" err="1" smtClean="0">
+                <a:latin typeface="Courier New" pitchFamily="49" charset="0"/>
+                <a:cs typeface="Courier New" pitchFamily="49" charset="0"/>
+              </a:rPr>
+              <a:t>ArrayList</a:t>
+            </a:r>
+            <a:r>
+              <a:rPr lang="pt-BR" b="1" dirty="0" smtClean="0">
+                <a:latin typeface="Courier New" pitchFamily="49" charset="0"/>
+                <a:cs typeface="Courier New" pitchFamily="49" charset="0"/>
+              </a:rPr>
+              <a:t>();</a:t>
+            </a:r>
+          </a:p>
+        </p:txBody>
+      </p:sp>
+    </p:spTree>
+  </p:cSld>
+  <p:clrMapOvr>
+    <a:masterClrMapping/>
+  </p:clrMapOvr>
+</p:sld>
+</file>
+
 <file path=ppt/slides/slide2.xml><?xml version="1.0" encoding="utf-8"?>
 <p:sld xmlns:a="http://schemas.openxmlformats.org/drawingml/2006/main" xmlns:r="http://schemas.openxmlformats.org/officeDocument/2006/relationships" xmlns:p="http://schemas.openxmlformats.org/presentationml/2006/main">
   <p:cSld>
@@ -4369,7 +5353,7 @@
         <p:spPr/>
         <p:txBody>
           <a:bodyPr>
-            <a:normAutofit lnSpcReduction="10000"/>
+            <a:normAutofit/>
           </a:bodyPr>
           <a:lstStyle/>
           <a:p>
@@ -4393,8 +5377,16 @@
           <a:p>
             <a:r>
               <a:rPr lang="pt-BR" dirty="0" smtClean="0"/>
-              <a:t>Busca, Inserção e Remoção</a:t>
-            </a:r>
+              <a:t>Operações com Vetor:</a:t>
+            </a:r>
+          </a:p>
+          <a:p>
+            <a:pPr lvl="1"/>
+            <a:r>
+              <a:rPr lang="pt-BR" dirty="0" smtClean="0"/>
+              <a:t>Busca, Inserção, Remoção, Ordenação</a:t>
+            </a:r>
+            <a:endParaRPr lang="pt-BR" dirty="0" smtClean="0"/>
           </a:p>
           <a:p>
             <a:r>
@@ -4405,32 +5397,12 @@
               <a:rPr lang="pt-BR" dirty="0" smtClean="0"/>
               <a:t>Dinâmicos</a:t>
             </a:r>
-          </a:p>
-          <a:p>
-            <a:pPr lvl="1"/>
-            <a:r>
-              <a:rPr lang="pt-BR" dirty="0" err="1" smtClean="0"/>
-              <a:t>LinkedList</a:t>
-            </a:r>
-            <a:endParaRPr lang="pt-BR" dirty="0" smtClean="0"/>
           </a:p>
           <a:p>
             <a:pPr lvl="1"/>
             <a:r>
               <a:rPr lang="pt-BR" dirty="0" err="1" smtClean="0"/>
               <a:t>ArrayList</a:t>
-            </a:r>
-            <a:endParaRPr lang="pt-BR" dirty="0" smtClean="0"/>
-          </a:p>
-          <a:p>
-            <a:pPr lvl="1"/>
-            <a:r>
-              <a:rPr lang="pt-BR" dirty="0" err="1" smtClean="0"/>
-              <a:t>List</a:t>
-            </a:r>
-            <a:r>
-              <a:rPr lang="pt-BR" dirty="0" smtClean="0"/>
-              <a:t>&lt;T&gt;</a:t>
             </a:r>
             <a:endParaRPr lang="pt-BR" dirty="0" smtClean="0"/>
           </a:p>
@@ -4454,6 +5426,900 @@
             </a:endParaRPr>
           </a:p>
           <a:p>
+            <a:endParaRPr lang="pt-BR" dirty="0"/>
+          </a:p>
+        </p:txBody>
+      </p:sp>
+    </p:spTree>
+  </p:cSld>
+  <p:clrMapOvr>
+    <a:masterClrMapping/>
+  </p:clrMapOvr>
+</p:sld>
+</file>
+
+<file path=ppt/slides/slide20.xml><?xml version="1.0" encoding="utf-8"?>
+<p:sld xmlns:a="http://schemas.openxmlformats.org/drawingml/2006/main" xmlns:r="http://schemas.openxmlformats.org/officeDocument/2006/relationships" xmlns:p="http://schemas.openxmlformats.org/presentationml/2006/main">
+  <p:cSld>
+    <p:spTree>
+      <p:nvGrpSpPr>
+        <p:cNvPr id="1" name=""/>
+        <p:cNvGrpSpPr/>
+        <p:nvPr/>
+      </p:nvGrpSpPr>
+      <p:grpSpPr>
+        <a:xfrm>
+          <a:off x="0" y="0"/>
+          <a:ext cx="0" cy="0"/>
+          <a:chOff x="0" y="0"/>
+          <a:chExt cx="0" cy="0"/>
+        </a:xfrm>
+      </p:grpSpPr>
+      <p:sp>
+        <p:nvSpPr>
+          <p:cNvPr id="2" name="Título 1"/>
+          <p:cNvSpPr>
+            <a:spLocks noGrp="1"/>
+          </p:cNvSpPr>
+          <p:nvPr>
+            <p:ph type="title"/>
+          </p:nvPr>
+        </p:nvSpPr>
+        <p:spPr/>
+        <p:txBody>
+          <a:bodyPr/>
+          <a:lstStyle/>
+          <a:p>
+            <a:r>
+              <a:rPr lang="pt-BR" dirty="0" err="1" smtClean="0"/>
+              <a:t>ArrayList</a:t>
+            </a:r>
+            <a:endParaRPr lang="pt-BR" dirty="0"/>
+          </a:p>
+        </p:txBody>
+      </p:sp>
+      <p:sp>
+        <p:nvSpPr>
+          <p:cNvPr id="3" name="Espaço Reservado para Conteúdo 2"/>
+          <p:cNvSpPr>
+            <a:spLocks noGrp="1"/>
+          </p:cNvSpPr>
+          <p:nvPr>
+            <p:ph idx="1"/>
+          </p:nvPr>
+        </p:nvSpPr>
+        <p:spPr/>
+        <p:txBody>
+          <a:bodyPr/>
+          <a:lstStyle/>
+          <a:p>
+            <a:r>
+              <a:rPr lang="pt-BR" dirty="0" smtClean="0"/>
+              <a:t>Função </a:t>
+            </a:r>
+            <a:r>
+              <a:rPr lang="pt-BR" dirty="0" err="1" smtClean="0">
+                <a:solidFill>
+                  <a:srgbClr val="92D050"/>
+                </a:solidFill>
+              </a:rPr>
+              <a:t>Add</a:t>
+            </a:r>
+            <a:endParaRPr lang="pt-BR" dirty="0" smtClean="0">
+              <a:solidFill>
+                <a:srgbClr val="92D050"/>
+              </a:solidFill>
+            </a:endParaRPr>
+          </a:p>
+          <a:p>
+            <a:pPr lvl="1"/>
+            <a:r>
+              <a:rPr lang="pt-BR" dirty="0" smtClean="0"/>
+              <a:t>Insere um elemento ao final do vetor.</a:t>
+            </a:r>
+          </a:p>
+          <a:p>
+            <a:pPr lvl="1"/>
+            <a:r>
+              <a:rPr lang="pt-BR" dirty="0" smtClean="0"/>
+              <a:t>Ex.: Inserir o número 50 no final do vetor.</a:t>
+            </a:r>
+          </a:p>
+          <a:p>
+            <a:pPr lvl="1"/>
+            <a:r>
+              <a:rPr lang="pt-BR" b="1" dirty="0" err="1" smtClean="0">
+                <a:latin typeface="Courier New" pitchFamily="49" charset="0"/>
+                <a:cs typeface="Courier New" pitchFamily="49" charset="0"/>
+              </a:rPr>
+              <a:t>dinamico</a:t>
+            </a:r>
+            <a:r>
+              <a:rPr lang="pt-BR" b="1" dirty="0" smtClean="0">
+                <a:latin typeface="Courier New" pitchFamily="49" charset="0"/>
+                <a:cs typeface="Courier New" pitchFamily="49" charset="0"/>
+              </a:rPr>
+              <a:t>.</a:t>
+            </a:r>
+            <a:r>
+              <a:rPr lang="pt-BR" b="1" dirty="0" err="1" smtClean="0">
+                <a:latin typeface="Courier New" pitchFamily="49" charset="0"/>
+                <a:cs typeface="Courier New" pitchFamily="49" charset="0"/>
+              </a:rPr>
+              <a:t>Add</a:t>
+            </a:r>
+            <a:r>
+              <a:rPr lang="pt-BR" b="1" dirty="0" smtClean="0">
+                <a:latin typeface="Courier New" pitchFamily="49" charset="0"/>
+                <a:cs typeface="Courier New" pitchFamily="49" charset="0"/>
+              </a:rPr>
+              <a:t>(50);</a:t>
+            </a:r>
+          </a:p>
+          <a:p>
+            <a:r>
+              <a:rPr lang="pt-BR" dirty="0" smtClean="0"/>
+              <a:t>Função </a:t>
+            </a:r>
+            <a:r>
+              <a:rPr lang="pt-BR" dirty="0" err="1" smtClean="0">
+                <a:solidFill>
+                  <a:srgbClr val="92D050"/>
+                </a:solidFill>
+              </a:rPr>
+              <a:t>Insert</a:t>
+            </a:r>
+            <a:endParaRPr lang="pt-BR" dirty="0" smtClean="0">
+              <a:solidFill>
+                <a:srgbClr val="92D050"/>
+              </a:solidFill>
+            </a:endParaRPr>
+          </a:p>
+          <a:p>
+            <a:pPr lvl="1"/>
+            <a:r>
+              <a:rPr lang="pt-BR" dirty="0" smtClean="0"/>
+              <a:t>Insere um elemento no índice especificado.</a:t>
+            </a:r>
+          </a:p>
+          <a:p>
+            <a:pPr lvl="1"/>
+            <a:r>
+              <a:rPr lang="pt-BR" dirty="0" smtClean="0"/>
+              <a:t>Ex.: Inserir o número 200 na posição 10.</a:t>
+            </a:r>
+          </a:p>
+          <a:p>
+            <a:pPr lvl="1"/>
+            <a:r>
+              <a:rPr lang="pt-BR" b="1" dirty="0" err="1" smtClean="0">
+                <a:latin typeface="Courier New" pitchFamily="49" charset="0"/>
+                <a:cs typeface="Courier New" pitchFamily="49" charset="0"/>
+              </a:rPr>
+              <a:t>dinamico</a:t>
+            </a:r>
+            <a:r>
+              <a:rPr lang="pt-BR" b="1" dirty="0" smtClean="0">
+                <a:latin typeface="Courier New" pitchFamily="49" charset="0"/>
+                <a:cs typeface="Courier New" pitchFamily="49" charset="0"/>
+              </a:rPr>
+              <a:t>.</a:t>
+            </a:r>
+            <a:r>
+              <a:rPr lang="pt-BR" b="1" dirty="0" err="1" smtClean="0">
+                <a:latin typeface="Courier New" pitchFamily="49" charset="0"/>
+                <a:cs typeface="Courier New" pitchFamily="49" charset="0"/>
+              </a:rPr>
+              <a:t>Insert</a:t>
+            </a:r>
+            <a:r>
+              <a:rPr lang="pt-BR" b="1" dirty="0" smtClean="0">
+                <a:latin typeface="Courier New" pitchFamily="49" charset="0"/>
+                <a:cs typeface="Courier New" pitchFamily="49" charset="0"/>
+              </a:rPr>
+              <a:t>(10, 200);</a:t>
+            </a:r>
+            <a:endParaRPr lang="pt-BR" b="1" dirty="0">
+              <a:latin typeface="Courier New" pitchFamily="49" charset="0"/>
+              <a:cs typeface="Courier New" pitchFamily="49" charset="0"/>
+            </a:endParaRPr>
+          </a:p>
+        </p:txBody>
+      </p:sp>
+    </p:spTree>
+  </p:cSld>
+  <p:clrMapOvr>
+    <a:masterClrMapping/>
+  </p:clrMapOvr>
+</p:sld>
+</file>
+
+<file path=ppt/slides/slide21.xml><?xml version="1.0" encoding="utf-8"?>
+<p:sld xmlns:a="http://schemas.openxmlformats.org/drawingml/2006/main" xmlns:r="http://schemas.openxmlformats.org/officeDocument/2006/relationships" xmlns:p="http://schemas.openxmlformats.org/presentationml/2006/main">
+  <p:cSld>
+    <p:spTree>
+      <p:nvGrpSpPr>
+        <p:cNvPr id="1" name=""/>
+        <p:cNvGrpSpPr/>
+        <p:nvPr/>
+      </p:nvGrpSpPr>
+      <p:grpSpPr>
+        <a:xfrm>
+          <a:off x="0" y="0"/>
+          <a:ext cx="0" cy="0"/>
+          <a:chOff x="0" y="0"/>
+          <a:chExt cx="0" cy="0"/>
+        </a:xfrm>
+      </p:grpSpPr>
+      <p:sp>
+        <p:nvSpPr>
+          <p:cNvPr id="2" name="Título 1"/>
+          <p:cNvSpPr>
+            <a:spLocks noGrp="1"/>
+          </p:cNvSpPr>
+          <p:nvPr>
+            <p:ph type="title"/>
+          </p:nvPr>
+        </p:nvSpPr>
+        <p:spPr/>
+        <p:txBody>
+          <a:bodyPr/>
+          <a:lstStyle/>
+          <a:p>
+            <a:r>
+              <a:rPr lang="pt-BR" dirty="0" err="1" smtClean="0"/>
+              <a:t>ArrayList</a:t>
+            </a:r>
+            <a:endParaRPr lang="pt-BR" dirty="0"/>
+          </a:p>
+        </p:txBody>
+      </p:sp>
+      <p:sp>
+        <p:nvSpPr>
+          <p:cNvPr id="3" name="Espaço Reservado para Conteúdo 2"/>
+          <p:cNvSpPr>
+            <a:spLocks noGrp="1"/>
+          </p:cNvSpPr>
+          <p:nvPr>
+            <p:ph idx="1"/>
+          </p:nvPr>
+        </p:nvSpPr>
+        <p:spPr/>
+        <p:txBody>
+          <a:bodyPr>
+            <a:normAutofit lnSpcReduction="10000"/>
+          </a:bodyPr>
+          <a:lstStyle/>
+          <a:p>
+            <a:r>
+              <a:rPr lang="pt-BR" dirty="0" smtClean="0"/>
+              <a:t>Função </a:t>
+            </a:r>
+            <a:r>
+              <a:rPr lang="pt-BR" dirty="0" smtClean="0">
+                <a:solidFill>
+                  <a:srgbClr val="92D050"/>
+                </a:solidFill>
+              </a:rPr>
+              <a:t>Remove</a:t>
+            </a:r>
+          </a:p>
+          <a:p>
+            <a:pPr lvl="1"/>
+            <a:r>
+              <a:rPr lang="pt-BR" dirty="0" smtClean="0"/>
+              <a:t>Remove a primeira ocorrência do valor.</a:t>
+            </a:r>
+          </a:p>
+          <a:p>
+            <a:pPr lvl="1"/>
+            <a:r>
+              <a:rPr lang="pt-BR" dirty="0" smtClean="0"/>
+              <a:t>Ex.: Remover o elemento com valor 50.</a:t>
+            </a:r>
+          </a:p>
+          <a:p>
+            <a:pPr lvl="1"/>
+            <a:r>
+              <a:rPr lang="pt-BR" b="1" dirty="0" err="1" smtClean="0">
+                <a:latin typeface="Courier New" pitchFamily="49" charset="0"/>
+                <a:cs typeface="Courier New" pitchFamily="49" charset="0"/>
+              </a:rPr>
+              <a:t>dinamico</a:t>
+            </a:r>
+            <a:r>
+              <a:rPr lang="pt-BR" b="1" dirty="0" smtClean="0">
+                <a:latin typeface="Courier New" pitchFamily="49" charset="0"/>
+                <a:cs typeface="Courier New" pitchFamily="49" charset="0"/>
+              </a:rPr>
+              <a:t>.Remove(50);</a:t>
+            </a:r>
+          </a:p>
+          <a:p>
+            <a:r>
+              <a:rPr lang="pt-BR" dirty="0" smtClean="0"/>
+              <a:t>Função </a:t>
+            </a:r>
+            <a:r>
+              <a:rPr lang="pt-BR" dirty="0" err="1" smtClean="0">
+                <a:solidFill>
+                  <a:srgbClr val="92D050"/>
+                </a:solidFill>
+              </a:rPr>
+              <a:t>RemoveAt</a:t>
+            </a:r>
+            <a:endParaRPr lang="pt-BR" dirty="0" smtClean="0">
+              <a:solidFill>
+                <a:srgbClr val="92D050"/>
+              </a:solidFill>
+            </a:endParaRPr>
+          </a:p>
+          <a:p>
+            <a:pPr lvl="1"/>
+            <a:r>
+              <a:rPr lang="pt-BR" dirty="0" smtClean="0"/>
+              <a:t>Remove o elemento que está na posição especificada.</a:t>
+            </a:r>
+          </a:p>
+          <a:p>
+            <a:pPr lvl="1"/>
+            <a:r>
+              <a:rPr lang="pt-BR" dirty="0" smtClean="0"/>
+              <a:t>Ex.: Remover o elemento que está na posição 10.</a:t>
+            </a:r>
+          </a:p>
+          <a:p>
+            <a:pPr lvl="1"/>
+            <a:r>
+              <a:rPr lang="pt-BR" b="1" dirty="0" err="1" smtClean="0">
+                <a:latin typeface="Courier New" pitchFamily="49" charset="0"/>
+                <a:cs typeface="Courier New" pitchFamily="49" charset="0"/>
+              </a:rPr>
+              <a:t>dinamico</a:t>
+            </a:r>
+            <a:r>
+              <a:rPr lang="pt-BR" b="1" dirty="0" smtClean="0">
+                <a:latin typeface="Courier New" pitchFamily="49" charset="0"/>
+                <a:cs typeface="Courier New" pitchFamily="49" charset="0"/>
+              </a:rPr>
+              <a:t>.</a:t>
+            </a:r>
+            <a:r>
+              <a:rPr lang="pt-BR" b="1" dirty="0" err="1" smtClean="0">
+                <a:latin typeface="Courier New" pitchFamily="49" charset="0"/>
+                <a:cs typeface="Courier New" pitchFamily="49" charset="0"/>
+              </a:rPr>
+              <a:t>RemoveAt</a:t>
+            </a:r>
+            <a:r>
+              <a:rPr lang="pt-BR" b="1" dirty="0" smtClean="0">
+                <a:latin typeface="Courier New" pitchFamily="49" charset="0"/>
+                <a:cs typeface="Courier New" pitchFamily="49" charset="0"/>
+              </a:rPr>
+              <a:t>(10);</a:t>
+            </a:r>
+            <a:endParaRPr lang="pt-BR" b="1" dirty="0">
+              <a:latin typeface="Courier New" pitchFamily="49" charset="0"/>
+              <a:cs typeface="Courier New" pitchFamily="49" charset="0"/>
+            </a:endParaRPr>
+          </a:p>
+        </p:txBody>
+      </p:sp>
+    </p:spTree>
+  </p:cSld>
+  <p:clrMapOvr>
+    <a:masterClrMapping/>
+  </p:clrMapOvr>
+</p:sld>
+</file>
+
+<file path=ppt/slides/slide22.xml><?xml version="1.0" encoding="utf-8"?>
+<p:sld xmlns:a="http://schemas.openxmlformats.org/drawingml/2006/main" xmlns:r="http://schemas.openxmlformats.org/officeDocument/2006/relationships" xmlns:p="http://schemas.openxmlformats.org/presentationml/2006/main">
+  <p:cSld>
+    <p:spTree>
+      <p:nvGrpSpPr>
+        <p:cNvPr id="1" name=""/>
+        <p:cNvGrpSpPr/>
+        <p:nvPr/>
+      </p:nvGrpSpPr>
+      <p:grpSpPr>
+        <a:xfrm>
+          <a:off x="0" y="0"/>
+          <a:ext cx="0" cy="0"/>
+          <a:chOff x="0" y="0"/>
+          <a:chExt cx="0" cy="0"/>
+        </a:xfrm>
+      </p:grpSpPr>
+      <p:sp>
+        <p:nvSpPr>
+          <p:cNvPr id="2" name="Título 1"/>
+          <p:cNvSpPr>
+            <a:spLocks noGrp="1"/>
+          </p:cNvSpPr>
+          <p:nvPr>
+            <p:ph type="title"/>
+          </p:nvPr>
+        </p:nvSpPr>
+        <p:spPr/>
+        <p:txBody>
+          <a:bodyPr/>
+          <a:lstStyle/>
+          <a:p>
+            <a:r>
+              <a:rPr lang="pt-BR" dirty="0" err="1" smtClean="0"/>
+              <a:t>ArrayList</a:t>
+            </a:r>
+            <a:endParaRPr lang="pt-BR" dirty="0"/>
+          </a:p>
+        </p:txBody>
+      </p:sp>
+      <p:sp>
+        <p:nvSpPr>
+          <p:cNvPr id="3" name="Espaço Reservado para Conteúdo 2"/>
+          <p:cNvSpPr>
+            <a:spLocks noGrp="1"/>
+          </p:cNvSpPr>
+          <p:nvPr>
+            <p:ph idx="1"/>
+          </p:nvPr>
+        </p:nvSpPr>
+        <p:spPr/>
+        <p:txBody>
+          <a:bodyPr>
+            <a:normAutofit fontScale="92500" lnSpcReduction="10000"/>
+          </a:bodyPr>
+          <a:lstStyle/>
+          <a:p>
+            <a:r>
+              <a:rPr lang="pt-BR" dirty="0" smtClean="0">
+                <a:solidFill>
+                  <a:srgbClr val="92D050"/>
+                </a:solidFill>
+              </a:rPr>
+              <a:t>Busca por Índice</a:t>
+            </a:r>
+          </a:p>
+          <a:p>
+            <a:pPr lvl="1"/>
+            <a:r>
+              <a:rPr lang="pt-BR" dirty="0" smtClean="0"/>
+              <a:t>Idêntico a vetores estáticos: </a:t>
+            </a:r>
+            <a:r>
+              <a:rPr lang="pt-BR" b="1" dirty="0" err="1" smtClean="0">
+                <a:latin typeface="Courier New" pitchFamily="49" charset="0"/>
+                <a:cs typeface="Courier New" pitchFamily="49" charset="0"/>
+              </a:rPr>
+              <a:t>dinamico</a:t>
+            </a:r>
+            <a:r>
+              <a:rPr lang="pt-BR" b="1" dirty="0" smtClean="0">
+                <a:latin typeface="Courier New" pitchFamily="49" charset="0"/>
+                <a:cs typeface="Courier New" pitchFamily="49" charset="0"/>
+              </a:rPr>
+              <a:t>[10]</a:t>
+            </a:r>
+          </a:p>
+          <a:p>
+            <a:r>
+              <a:rPr lang="pt-BR" dirty="0" smtClean="0"/>
+              <a:t>Função </a:t>
+            </a:r>
+            <a:r>
+              <a:rPr lang="pt-BR" dirty="0" err="1" smtClean="0">
+                <a:solidFill>
+                  <a:srgbClr val="92D050"/>
+                </a:solidFill>
+              </a:rPr>
+              <a:t>IndexOf</a:t>
+            </a:r>
+            <a:r>
+              <a:rPr lang="pt-BR" dirty="0" smtClean="0"/>
+              <a:t> (Busca </a:t>
+            </a:r>
+            <a:r>
+              <a:rPr lang="pt-BR" dirty="0" err="1" smtClean="0"/>
+              <a:t>Sequencial</a:t>
+            </a:r>
+            <a:r>
+              <a:rPr lang="pt-BR" dirty="0" smtClean="0"/>
+              <a:t>)</a:t>
+            </a:r>
+          </a:p>
+          <a:p>
+            <a:pPr lvl="1"/>
+            <a:r>
+              <a:rPr lang="pt-BR" dirty="0" smtClean="0"/>
+              <a:t>Retorna a posição do elemento com o valor especificado. Não requer que o vetor esteja ordenado.</a:t>
+            </a:r>
+          </a:p>
+          <a:p>
+            <a:pPr lvl="1"/>
+            <a:r>
+              <a:rPr lang="pt-BR" dirty="0" smtClean="0"/>
+              <a:t>Se o elemento não existir no vetor, retorna um valor negativo.</a:t>
+            </a:r>
+          </a:p>
+          <a:p>
+            <a:pPr lvl="1"/>
+            <a:r>
+              <a:rPr lang="pt-BR" dirty="0" smtClean="0"/>
+              <a:t>Ex.: Retornar o índice em que se encontra o valor 200</a:t>
+            </a:r>
+          </a:p>
+          <a:p>
+            <a:pPr lvl="1"/>
+            <a:r>
+              <a:rPr lang="pt-BR" b="1" dirty="0" err="1" smtClean="0">
+                <a:latin typeface="Courier New" pitchFamily="49" charset="0"/>
+                <a:cs typeface="Courier New" pitchFamily="49" charset="0"/>
+              </a:rPr>
+              <a:t>dinamico</a:t>
+            </a:r>
+            <a:r>
+              <a:rPr lang="pt-BR" b="1" dirty="0" smtClean="0">
+                <a:latin typeface="Courier New" pitchFamily="49" charset="0"/>
+                <a:cs typeface="Courier New" pitchFamily="49" charset="0"/>
+              </a:rPr>
+              <a:t>.</a:t>
+            </a:r>
+            <a:r>
+              <a:rPr lang="pt-BR" b="1" dirty="0" err="1" smtClean="0">
+                <a:latin typeface="Courier New" pitchFamily="49" charset="0"/>
+                <a:cs typeface="Courier New" pitchFamily="49" charset="0"/>
+              </a:rPr>
+              <a:t>IndexOf</a:t>
+            </a:r>
+            <a:r>
+              <a:rPr lang="pt-BR" b="1" dirty="0" smtClean="0">
+                <a:latin typeface="Courier New" pitchFamily="49" charset="0"/>
+                <a:cs typeface="Courier New" pitchFamily="49" charset="0"/>
+              </a:rPr>
+              <a:t>(200);</a:t>
+            </a:r>
+            <a:endParaRPr lang="pt-BR" b="1" dirty="0">
+              <a:latin typeface="Courier New" pitchFamily="49" charset="0"/>
+              <a:cs typeface="Courier New" pitchFamily="49" charset="0"/>
+            </a:endParaRPr>
+          </a:p>
+        </p:txBody>
+      </p:sp>
+    </p:spTree>
+  </p:cSld>
+  <p:clrMapOvr>
+    <a:masterClrMapping/>
+  </p:clrMapOvr>
+</p:sld>
+</file>
+
+<file path=ppt/slides/slide23.xml><?xml version="1.0" encoding="utf-8"?>
+<p:sld xmlns:a="http://schemas.openxmlformats.org/drawingml/2006/main" xmlns:r="http://schemas.openxmlformats.org/officeDocument/2006/relationships" xmlns:p="http://schemas.openxmlformats.org/presentationml/2006/main">
+  <p:cSld>
+    <p:spTree>
+      <p:nvGrpSpPr>
+        <p:cNvPr id="1" name=""/>
+        <p:cNvGrpSpPr/>
+        <p:nvPr/>
+      </p:nvGrpSpPr>
+      <p:grpSpPr>
+        <a:xfrm>
+          <a:off x="0" y="0"/>
+          <a:ext cx="0" cy="0"/>
+          <a:chOff x="0" y="0"/>
+          <a:chExt cx="0" cy="0"/>
+        </a:xfrm>
+      </p:grpSpPr>
+      <p:sp>
+        <p:nvSpPr>
+          <p:cNvPr id="2" name="Título 1"/>
+          <p:cNvSpPr>
+            <a:spLocks noGrp="1"/>
+          </p:cNvSpPr>
+          <p:nvPr>
+            <p:ph type="title"/>
+          </p:nvPr>
+        </p:nvSpPr>
+        <p:spPr/>
+        <p:txBody>
+          <a:bodyPr/>
+          <a:lstStyle/>
+          <a:p>
+            <a:r>
+              <a:rPr lang="pt-BR" dirty="0" err="1" smtClean="0"/>
+              <a:t>ArrayList</a:t>
+            </a:r>
+            <a:endParaRPr lang="pt-BR" dirty="0"/>
+          </a:p>
+        </p:txBody>
+      </p:sp>
+      <p:sp>
+        <p:nvSpPr>
+          <p:cNvPr id="3" name="Espaço Reservado para Conteúdo 2"/>
+          <p:cNvSpPr>
+            <a:spLocks noGrp="1"/>
+          </p:cNvSpPr>
+          <p:nvPr>
+            <p:ph idx="1"/>
+          </p:nvPr>
+        </p:nvSpPr>
+        <p:spPr/>
+        <p:txBody>
+          <a:bodyPr/>
+          <a:lstStyle/>
+          <a:p>
+            <a:r>
+              <a:rPr lang="pt-BR" dirty="0" smtClean="0"/>
+              <a:t>Função </a:t>
+            </a:r>
+            <a:r>
+              <a:rPr lang="pt-BR" dirty="0" err="1" smtClean="0">
+                <a:solidFill>
+                  <a:srgbClr val="92D050"/>
+                </a:solidFill>
+              </a:rPr>
+              <a:t>BinarySearch</a:t>
+            </a:r>
+            <a:r>
+              <a:rPr lang="pt-BR" dirty="0" smtClean="0"/>
+              <a:t> (Busca Binária)</a:t>
+            </a:r>
+          </a:p>
+          <a:p>
+            <a:pPr lvl="1"/>
+            <a:r>
+              <a:rPr lang="pt-BR" dirty="0" smtClean="0"/>
+              <a:t>Retorna a posição do elemento com valor especificado. Requer que o vetor esteja ordenado.</a:t>
+            </a:r>
+          </a:p>
+          <a:p>
+            <a:pPr lvl="1"/>
+            <a:r>
+              <a:rPr lang="pt-BR" dirty="0" smtClean="0"/>
+              <a:t>Se o elemento não existir no vetor, retorna um valor negativo</a:t>
+            </a:r>
+          </a:p>
+          <a:p>
+            <a:pPr lvl="1"/>
+            <a:r>
+              <a:rPr lang="pt-BR" dirty="0" smtClean="0"/>
+              <a:t>Ex.: Retornar o índice em que se encontra o valor 200</a:t>
+            </a:r>
+          </a:p>
+          <a:p>
+            <a:pPr lvl="1"/>
+            <a:r>
+              <a:rPr lang="pt-BR" b="1" dirty="0" err="1" smtClean="0">
+                <a:latin typeface="Courier New" pitchFamily="49" charset="0"/>
+                <a:cs typeface="Courier New" pitchFamily="49" charset="0"/>
+              </a:rPr>
+              <a:t>dinamico</a:t>
+            </a:r>
+            <a:r>
+              <a:rPr lang="pt-BR" b="1" dirty="0" smtClean="0">
+                <a:latin typeface="Courier New" pitchFamily="49" charset="0"/>
+                <a:cs typeface="Courier New" pitchFamily="49" charset="0"/>
+              </a:rPr>
+              <a:t>.</a:t>
+            </a:r>
+            <a:r>
+              <a:rPr lang="pt-BR" b="1" dirty="0" err="1" smtClean="0">
+                <a:latin typeface="Courier New" pitchFamily="49" charset="0"/>
+                <a:cs typeface="Courier New" pitchFamily="49" charset="0"/>
+              </a:rPr>
+              <a:t>BinarySearch</a:t>
+            </a:r>
+            <a:r>
+              <a:rPr lang="pt-BR" b="1" dirty="0" smtClean="0">
+                <a:latin typeface="Courier New" pitchFamily="49" charset="0"/>
+                <a:cs typeface="Courier New" pitchFamily="49" charset="0"/>
+              </a:rPr>
+              <a:t>(200);</a:t>
+            </a:r>
+            <a:endParaRPr lang="pt-BR" b="1" dirty="0">
+              <a:latin typeface="Courier New" pitchFamily="49" charset="0"/>
+              <a:cs typeface="Courier New" pitchFamily="49" charset="0"/>
+            </a:endParaRPr>
+          </a:p>
+        </p:txBody>
+      </p:sp>
+    </p:spTree>
+  </p:cSld>
+  <p:clrMapOvr>
+    <a:masterClrMapping/>
+  </p:clrMapOvr>
+</p:sld>
+</file>
+
+<file path=ppt/slides/slide24.xml><?xml version="1.0" encoding="utf-8"?>
+<p:sld xmlns:a="http://schemas.openxmlformats.org/drawingml/2006/main" xmlns:r="http://schemas.openxmlformats.org/officeDocument/2006/relationships" xmlns:p="http://schemas.openxmlformats.org/presentationml/2006/main">
+  <p:cSld>
+    <p:spTree>
+      <p:nvGrpSpPr>
+        <p:cNvPr id="1" name=""/>
+        <p:cNvGrpSpPr/>
+        <p:nvPr/>
+      </p:nvGrpSpPr>
+      <p:grpSpPr>
+        <a:xfrm>
+          <a:off x="0" y="0"/>
+          <a:ext cx="0" cy="0"/>
+          <a:chOff x="0" y="0"/>
+          <a:chExt cx="0" cy="0"/>
+        </a:xfrm>
+      </p:grpSpPr>
+      <p:sp>
+        <p:nvSpPr>
+          <p:cNvPr id="2" name="Título 1"/>
+          <p:cNvSpPr>
+            <a:spLocks noGrp="1"/>
+          </p:cNvSpPr>
+          <p:nvPr>
+            <p:ph type="title"/>
+          </p:nvPr>
+        </p:nvSpPr>
+        <p:spPr/>
+        <p:txBody>
+          <a:bodyPr/>
+          <a:lstStyle/>
+          <a:p>
+            <a:r>
+              <a:rPr lang="pt-BR" dirty="0" err="1" smtClean="0"/>
+              <a:t>ArrayList</a:t>
+            </a:r>
+            <a:endParaRPr lang="pt-BR" dirty="0"/>
+          </a:p>
+        </p:txBody>
+      </p:sp>
+      <p:sp>
+        <p:nvSpPr>
+          <p:cNvPr id="3" name="Espaço Reservado para Conteúdo 2"/>
+          <p:cNvSpPr>
+            <a:spLocks noGrp="1"/>
+          </p:cNvSpPr>
+          <p:nvPr>
+            <p:ph idx="1"/>
+          </p:nvPr>
+        </p:nvSpPr>
+        <p:spPr/>
+        <p:txBody>
+          <a:bodyPr/>
+          <a:lstStyle/>
+          <a:p>
+            <a:r>
+              <a:rPr lang="pt-BR" dirty="0" smtClean="0"/>
+              <a:t>Função </a:t>
+            </a:r>
+            <a:r>
+              <a:rPr lang="pt-BR" dirty="0" err="1" smtClean="0">
+                <a:solidFill>
+                  <a:srgbClr val="92D050"/>
+                </a:solidFill>
+              </a:rPr>
+              <a:t>Sort</a:t>
+            </a:r>
+            <a:endParaRPr lang="pt-BR" dirty="0" smtClean="0">
+              <a:solidFill>
+                <a:srgbClr val="92D050"/>
+              </a:solidFill>
+            </a:endParaRPr>
+          </a:p>
+          <a:p>
+            <a:pPr lvl="1"/>
+            <a:r>
+              <a:rPr lang="pt-BR" dirty="0" smtClean="0"/>
+              <a:t>Ordena o vetor em ordem crescente</a:t>
+            </a:r>
+          </a:p>
+          <a:p>
+            <a:pPr lvl="1"/>
+            <a:r>
+              <a:rPr lang="pt-BR" dirty="0" smtClean="0"/>
+              <a:t>Utiliza o algoritmo </a:t>
+            </a:r>
+            <a:r>
+              <a:rPr lang="pt-BR" dirty="0" err="1" smtClean="0"/>
+              <a:t>Quick</a:t>
+            </a:r>
+            <a:r>
+              <a:rPr lang="pt-BR" dirty="0" smtClean="0"/>
+              <a:t> </a:t>
+            </a:r>
+            <a:r>
+              <a:rPr lang="pt-BR" dirty="0" err="1" smtClean="0"/>
+              <a:t>Sort</a:t>
+            </a:r>
+            <a:endParaRPr lang="pt-BR" dirty="0" smtClean="0"/>
+          </a:p>
+          <a:p>
+            <a:pPr lvl="1"/>
+            <a:r>
+              <a:rPr lang="pt-BR" b="1" dirty="0" err="1" smtClean="0">
+                <a:latin typeface="Courier New" pitchFamily="49" charset="0"/>
+                <a:cs typeface="Courier New" pitchFamily="49" charset="0"/>
+              </a:rPr>
+              <a:t>dinamico</a:t>
+            </a:r>
+            <a:r>
+              <a:rPr lang="pt-BR" b="1" dirty="0" smtClean="0">
+                <a:latin typeface="Courier New" pitchFamily="49" charset="0"/>
+                <a:cs typeface="Courier New" pitchFamily="49" charset="0"/>
+              </a:rPr>
+              <a:t>.</a:t>
+            </a:r>
+            <a:r>
+              <a:rPr lang="pt-BR" b="1" dirty="0" err="1" smtClean="0">
+                <a:latin typeface="Courier New" pitchFamily="49" charset="0"/>
+                <a:cs typeface="Courier New" pitchFamily="49" charset="0"/>
+              </a:rPr>
+              <a:t>Sort</a:t>
+            </a:r>
+            <a:r>
+              <a:rPr lang="pt-BR" b="1" dirty="0" smtClean="0">
+                <a:latin typeface="Courier New" pitchFamily="49" charset="0"/>
+                <a:cs typeface="Courier New" pitchFamily="49" charset="0"/>
+              </a:rPr>
+              <a:t>();</a:t>
+            </a:r>
+          </a:p>
+          <a:p>
+            <a:r>
+              <a:rPr lang="pt-BR" dirty="0" smtClean="0"/>
+              <a:t>Função </a:t>
+            </a:r>
+            <a:r>
+              <a:rPr lang="pt-BR" dirty="0" err="1" smtClean="0">
+                <a:solidFill>
+                  <a:srgbClr val="92D050"/>
+                </a:solidFill>
+              </a:rPr>
+              <a:t>Reverse</a:t>
+            </a:r>
+            <a:endParaRPr lang="pt-BR" dirty="0" smtClean="0">
+              <a:solidFill>
+                <a:srgbClr val="92D050"/>
+              </a:solidFill>
+            </a:endParaRPr>
+          </a:p>
+          <a:p>
+            <a:pPr lvl="1"/>
+            <a:r>
+              <a:rPr lang="pt-BR" dirty="0" smtClean="0"/>
+              <a:t>Inverte a ordem dos elementos</a:t>
+            </a:r>
+          </a:p>
+          <a:p>
+            <a:pPr lvl="1"/>
+            <a:r>
+              <a:rPr lang="pt-BR" b="1" dirty="0" err="1" smtClean="0">
+                <a:latin typeface="Courier New" pitchFamily="49" charset="0"/>
+                <a:cs typeface="Courier New" pitchFamily="49" charset="0"/>
+              </a:rPr>
+              <a:t>dinamico</a:t>
+            </a:r>
+            <a:r>
+              <a:rPr lang="pt-BR" b="1" dirty="0" smtClean="0">
+                <a:latin typeface="Courier New" pitchFamily="49" charset="0"/>
+                <a:cs typeface="Courier New" pitchFamily="49" charset="0"/>
+              </a:rPr>
+              <a:t>.</a:t>
+            </a:r>
+            <a:r>
+              <a:rPr lang="pt-BR" b="1" dirty="0" err="1" smtClean="0">
+                <a:latin typeface="Courier New" pitchFamily="49" charset="0"/>
+                <a:cs typeface="Courier New" pitchFamily="49" charset="0"/>
+              </a:rPr>
+              <a:t>Reverse</a:t>
+            </a:r>
+            <a:r>
+              <a:rPr lang="pt-BR" b="1" dirty="0" smtClean="0">
+                <a:latin typeface="Courier New" pitchFamily="49" charset="0"/>
+                <a:cs typeface="Courier New" pitchFamily="49" charset="0"/>
+              </a:rPr>
+              <a:t>();</a:t>
+            </a:r>
+          </a:p>
+          <a:p>
+            <a:pPr lvl="1"/>
             <a:endParaRPr lang="pt-BR" dirty="0"/>
           </a:p>
         </p:txBody>

</xml_diff>

<commit_message>
Alterando slide do Cap 5
</commit_message>
<xml_diff>
--- a/curso/modulo1capitulo5.pptx
+++ b/curso/modulo1capitulo5.pptx
@@ -515,7 +515,7 @@
             <a:fld id="{6B2AED99-3A78-46C3-A4E3-29F86B3E5DC3}" type="datetimeFigureOut">
               <a:rPr lang="pt-BR" smtClean="0"/>
               <a:pPr/>
-              <a:t>7/10/2014</a:t>
+              <a:t>8/10/2014</a:t>
             </a:fld>
             <a:endParaRPr lang="pt-BR"/>
           </a:p>
@@ -682,7 +682,7 @@
             <a:fld id="{6B2AED99-3A78-46C3-A4E3-29F86B3E5DC3}" type="datetimeFigureOut">
               <a:rPr lang="pt-BR" smtClean="0"/>
               <a:pPr/>
-              <a:t>7/10/2014</a:t>
+              <a:t>8/10/2014</a:t>
             </a:fld>
             <a:endParaRPr lang="pt-BR"/>
           </a:p>
@@ -859,7 +859,7 @@
             <a:fld id="{6B2AED99-3A78-46C3-A4E3-29F86B3E5DC3}" type="datetimeFigureOut">
               <a:rPr lang="pt-BR" smtClean="0"/>
               <a:pPr/>
-              <a:t>7/10/2014</a:t>
+              <a:t>8/10/2014</a:t>
             </a:fld>
             <a:endParaRPr lang="pt-BR"/>
           </a:p>
@@ -1030,7 +1030,7 @@
             <a:fld id="{6B2AED99-3A78-46C3-A4E3-29F86B3E5DC3}" type="datetimeFigureOut">
               <a:rPr lang="pt-BR" smtClean="0"/>
               <a:pPr/>
-              <a:t>7/10/2014</a:t>
+              <a:t>8/10/2014</a:t>
             </a:fld>
             <a:endParaRPr lang="pt-BR"/>
           </a:p>
@@ -1487,7 +1487,7 @@
             <a:fld id="{6B2AED99-3A78-46C3-A4E3-29F86B3E5DC3}" type="datetimeFigureOut">
               <a:rPr lang="pt-BR" smtClean="0"/>
               <a:pPr/>
-              <a:t>7/10/2014</a:t>
+              <a:t>8/10/2014</a:t>
             </a:fld>
             <a:endParaRPr lang="pt-BR"/>
           </a:p>
@@ -1753,7 +1753,7 @@
             <a:fld id="{6B2AED99-3A78-46C3-A4E3-29F86B3E5DC3}" type="datetimeFigureOut">
               <a:rPr lang="pt-BR" smtClean="0"/>
               <a:pPr/>
-              <a:t>7/10/2014</a:t>
+              <a:t>8/10/2014</a:t>
             </a:fld>
             <a:endParaRPr lang="pt-BR"/>
           </a:p>
@@ -2129,7 +2129,7 @@
             <a:fld id="{6B2AED99-3A78-46C3-A4E3-29F86B3E5DC3}" type="datetimeFigureOut">
               <a:rPr lang="pt-BR" smtClean="0"/>
               <a:pPr/>
-              <a:t>7/10/2014</a:t>
+              <a:t>8/10/2014</a:t>
             </a:fld>
             <a:endParaRPr lang="pt-BR"/>
           </a:p>
@@ -2253,7 +2253,7 @@
             <a:fld id="{6B2AED99-3A78-46C3-A4E3-29F86B3E5DC3}" type="datetimeFigureOut">
               <a:rPr lang="pt-BR" smtClean="0"/>
               <a:pPr/>
-              <a:t>7/10/2014</a:t>
+              <a:t>8/10/2014</a:t>
             </a:fld>
             <a:endParaRPr lang="pt-BR"/>
           </a:p>
@@ -2345,7 +2345,7 @@
             <a:fld id="{6B2AED99-3A78-46C3-A4E3-29F86B3E5DC3}" type="datetimeFigureOut">
               <a:rPr lang="pt-BR" smtClean="0"/>
               <a:pPr/>
-              <a:t>7/10/2014</a:t>
+              <a:t>8/10/2014</a:t>
             </a:fld>
             <a:endParaRPr lang="pt-BR"/>
           </a:p>
@@ -2596,7 +2596,7 @@
             <a:fld id="{6B2AED99-3A78-46C3-A4E3-29F86B3E5DC3}" type="datetimeFigureOut">
               <a:rPr lang="pt-BR" smtClean="0"/>
               <a:pPr/>
-              <a:t>7/10/2014</a:t>
+              <a:t>8/10/2014</a:t>
             </a:fld>
             <a:endParaRPr lang="pt-BR"/>
           </a:p>
@@ -2857,7 +2857,7 @@
             <a:fld id="{6B2AED99-3A78-46C3-A4E3-29F86B3E5DC3}" type="datetimeFigureOut">
               <a:rPr lang="pt-BR" smtClean="0"/>
               <a:pPr/>
-              <a:t>7/10/2014</a:t>
+              <a:t>8/10/2014</a:t>
             </a:fld>
             <a:endParaRPr lang="pt-BR"/>
           </a:p>
@@ -3263,7 +3263,7 @@
             <a:fld id="{6B2AED99-3A78-46C3-A4E3-29F86B3E5DC3}" type="datetimeFigureOut">
               <a:rPr lang="pt-BR" smtClean="0"/>
               <a:pPr/>
-              <a:t>7/10/2014</a:t>
+              <a:t>8/10/2014</a:t>
             </a:fld>
             <a:endParaRPr lang="pt-BR"/>
           </a:p>
@@ -5110,7 +5110,9 @@
         </p:nvSpPr>
         <p:spPr/>
         <p:txBody>
-          <a:bodyPr/>
+          <a:bodyPr>
+            <a:normAutofit fontScale="92500" lnSpcReduction="10000"/>
+          </a:bodyPr>
           <a:lstStyle/>
           <a:p>
             <a:r>
@@ -5266,6 +5268,42 @@
               </a:rPr>
               <a:t>();</a:t>
             </a:r>
+          </a:p>
+          <a:p>
+            <a:r>
+              <a:rPr lang="pt-BR" dirty="0" smtClean="0">
+                <a:cs typeface="Courier New" pitchFamily="49" charset="0"/>
+              </a:rPr>
+              <a:t>Número de elementos do vetor:</a:t>
+            </a:r>
+          </a:p>
+          <a:p>
+            <a:pPr lvl="1"/>
+            <a:r>
+              <a:rPr lang="pt-BR" b="1" dirty="0" err="1" smtClean="0">
+                <a:latin typeface="Courier New" pitchFamily="49" charset="0"/>
+                <a:cs typeface="Courier New" pitchFamily="49" charset="0"/>
+              </a:rPr>
+              <a:t>dinamico</a:t>
+            </a:r>
+            <a:r>
+              <a:rPr lang="pt-BR" b="1" dirty="0" smtClean="0">
+                <a:latin typeface="Courier New" pitchFamily="49" charset="0"/>
+                <a:cs typeface="Courier New" pitchFamily="49" charset="0"/>
+              </a:rPr>
+              <a:t>.</a:t>
+            </a:r>
+            <a:r>
+              <a:rPr lang="pt-BR" b="1" dirty="0" err="1" smtClean="0">
+                <a:latin typeface="Courier New" pitchFamily="49" charset="0"/>
+                <a:cs typeface="Courier New" pitchFamily="49" charset="0"/>
+              </a:rPr>
+              <a:t>Count</a:t>
+            </a:r>
+            <a:endParaRPr lang="pt-BR" b="1" dirty="0" smtClean="0">
+              <a:latin typeface="Courier New" pitchFamily="49" charset="0"/>
+              <a:cs typeface="Courier New" pitchFamily="49" charset="0"/>
+            </a:endParaRPr>
           </a:p>
         </p:txBody>
       </p:sp>
@@ -5768,14 +5806,7 @@
                 <a:latin typeface="Courier New" pitchFamily="49" charset="0"/>
                 <a:cs typeface="Courier New" pitchFamily="49" charset="0"/>
               </a:rPr>
-              <a:t>(10</a:t>
-            </a:r>
-            <a:r>
-              <a:rPr lang="pt-BR" b="1" dirty="0" smtClean="0">
-                <a:latin typeface="Courier New" pitchFamily="49" charset="0"/>
-                <a:cs typeface="Courier New" pitchFamily="49" charset="0"/>
-              </a:rPr>
-              <a:t>);</a:t>
+              <a:t>(10);</a:t>
             </a:r>
           </a:p>
           <a:p>

</xml_diff>

<commit_message>
Curso de Programação C# M1 C5 P5
</commit_message>
<xml_diff>
--- a/curso/modulo1capitulo5.pptx
+++ b/curso/modulo1capitulo5.pptx
@@ -37,6 +37,8 @@
     <p:sldId id="275" r:id="rId31"/>
     <p:sldId id="276" r:id="rId32"/>
     <p:sldId id="279" r:id="rId33"/>
+    <p:sldId id="288" r:id="rId34"/>
+    <p:sldId id="289" r:id="rId35"/>
   </p:sldIdLst>
   <p:sldSz cx="9144000" cy="6858000" type="screen4x3"/>
   <p:notesSz cx="6858000" cy="9144000"/>
@@ -523,7 +525,7 @@
             <a:fld id="{6B2AED99-3A78-46C3-A4E3-29F86B3E5DC3}" type="datetimeFigureOut">
               <a:rPr lang="pt-BR" smtClean="0"/>
               <a:pPr/>
-              <a:t>11/10/2014</a:t>
+              <a:t>12/10/2014</a:t>
             </a:fld>
             <a:endParaRPr lang="pt-BR"/>
           </a:p>
@@ -690,7 +692,7 @@
             <a:fld id="{6B2AED99-3A78-46C3-A4E3-29F86B3E5DC3}" type="datetimeFigureOut">
               <a:rPr lang="pt-BR" smtClean="0"/>
               <a:pPr/>
-              <a:t>11/10/2014</a:t>
+              <a:t>12/10/2014</a:t>
             </a:fld>
             <a:endParaRPr lang="pt-BR"/>
           </a:p>
@@ -867,7 +869,7 @@
             <a:fld id="{6B2AED99-3A78-46C3-A4E3-29F86B3E5DC3}" type="datetimeFigureOut">
               <a:rPr lang="pt-BR" smtClean="0"/>
               <a:pPr/>
-              <a:t>11/10/2014</a:t>
+              <a:t>12/10/2014</a:t>
             </a:fld>
             <a:endParaRPr lang="pt-BR"/>
           </a:p>
@@ -1038,7 +1040,7 @@
             <a:fld id="{6B2AED99-3A78-46C3-A4E3-29F86B3E5DC3}" type="datetimeFigureOut">
               <a:rPr lang="pt-BR" smtClean="0"/>
               <a:pPr/>
-              <a:t>11/10/2014</a:t>
+              <a:t>12/10/2014</a:t>
             </a:fld>
             <a:endParaRPr lang="pt-BR"/>
           </a:p>
@@ -1495,7 +1497,7 @@
             <a:fld id="{6B2AED99-3A78-46C3-A4E3-29F86B3E5DC3}" type="datetimeFigureOut">
               <a:rPr lang="pt-BR" smtClean="0"/>
               <a:pPr/>
-              <a:t>11/10/2014</a:t>
+              <a:t>12/10/2014</a:t>
             </a:fld>
             <a:endParaRPr lang="pt-BR"/>
           </a:p>
@@ -1761,7 +1763,7 @@
             <a:fld id="{6B2AED99-3A78-46C3-A4E3-29F86B3E5DC3}" type="datetimeFigureOut">
               <a:rPr lang="pt-BR" smtClean="0"/>
               <a:pPr/>
-              <a:t>11/10/2014</a:t>
+              <a:t>12/10/2014</a:t>
             </a:fld>
             <a:endParaRPr lang="pt-BR"/>
           </a:p>
@@ -2137,7 +2139,7 @@
             <a:fld id="{6B2AED99-3A78-46C3-A4E3-29F86B3E5DC3}" type="datetimeFigureOut">
               <a:rPr lang="pt-BR" smtClean="0"/>
               <a:pPr/>
-              <a:t>11/10/2014</a:t>
+              <a:t>12/10/2014</a:t>
             </a:fld>
             <a:endParaRPr lang="pt-BR"/>
           </a:p>
@@ -2261,7 +2263,7 @@
             <a:fld id="{6B2AED99-3A78-46C3-A4E3-29F86B3E5DC3}" type="datetimeFigureOut">
               <a:rPr lang="pt-BR" smtClean="0"/>
               <a:pPr/>
-              <a:t>11/10/2014</a:t>
+              <a:t>12/10/2014</a:t>
             </a:fld>
             <a:endParaRPr lang="pt-BR"/>
           </a:p>
@@ -2353,7 +2355,7 @@
             <a:fld id="{6B2AED99-3A78-46C3-A4E3-29F86B3E5DC3}" type="datetimeFigureOut">
               <a:rPr lang="pt-BR" smtClean="0"/>
               <a:pPr/>
-              <a:t>11/10/2014</a:t>
+              <a:t>12/10/2014</a:t>
             </a:fld>
             <a:endParaRPr lang="pt-BR"/>
           </a:p>
@@ -2604,7 +2606,7 @@
             <a:fld id="{6B2AED99-3A78-46C3-A4E3-29F86B3E5DC3}" type="datetimeFigureOut">
               <a:rPr lang="pt-BR" smtClean="0"/>
               <a:pPr/>
-              <a:t>11/10/2014</a:t>
+              <a:t>12/10/2014</a:t>
             </a:fld>
             <a:endParaRPr lang="pt-BR"/>
           </a:p>
@@ -2865,7 +2867,7 @@
             <a:fld id="{6B2AED99-3A78-46C3-A4E3-29F86B3E5DC3}" type="datetimeFigureOut">
               <a:rPr lang="pt-BR" smtClean="0"/>
               <a:pPr/>
-              <a:t>11/10/2014</a:t>
+              <a:t>12/10/2014</a:t>
             </a:fld>
             <a:endParaRPr lang="pt-BR"/>
           </a:p>
@@ -3271,7 +3273,7 @@
             <a:fld id="{6B2AED99-3A78-46C3-A4E3-29F86B3E5DC3}" type="datetimeFigureOut">
               <a:rPr lang="pt-BR" smtClean="0"/>
               <a:pPr/>
-              <a:t>11/10/2014</a:t>
+              <a:t>12/10/2014</a:t>
             </a:fld>
             <a:endParaRPr lang="pt-BR"/>
           </a:p>
@@ -4537,13 +4539,8 @@
             </a:r>
             <a:r>
               <a:rPr lang="pt-BR" dirty="0" smtClean="0"/>
-              <a:t> </a:t>
-            </a:r>
-            <a:r>
-              <a:rPr lang="pt-BR" dirty="0" smtClean="0"/>
-              <a:t>(bolha)</a:t>
-            </a:r>
-            <a:endParaRPr lang="pt-BR" dirty="0" smtClean="0"/>
+              <a:t> (bolha)</a:t>
+            </a:r>
           </a:p>
           <a:p>
             <a:pPr lvl="1"/>
@@ -4580,13 +4577,8 @@
             </a:r>
             <a:r>
               <a:rPr lang="pt-BR" dirty="0" smtClean="0"/>
-              <a:t> </a:t>
-            </a:r>
-            <a:r>
-              <a:rPr lang="pt-BR" dirty="0" smtClean="0"/>
-              <a:t>(inserção)</a:t>
-            </a:r>
-            <a:endParaRPr lang="pt-BR" dirty="0" smtClean="0"/>
+              <a:t> (inserção)</a:t>
+            </a:r>
           </a:p>
           <a:p>
             <a:pPr lvl="1"/>
@@ -7659,6 +7651,384 @@
           <a:p>
             <a:pPr lvl="1"/>
             <a:endParaRPr lang="pt-BR" dirty="0"/>
+          </a:p>
+        </p:txBody>
+      </p:sp>
+    </p:spTree>
+  </p:cSld>
+  <p:clrMapOvr>
+    <a:masterClrMapping/>
+  </p:clrMapOvr>
+</p:sld>
+</file>
+
+<file path=ppt/slides/slide33.xml><?xml version="1.0" encoding="utf-8"?>
+<p:sld xmlns:a="http://schemas.openxmlformats.org/drawingml/2006/main" xmlns:r="http://schemas.openxmlformats.org/officeDocument/2006/relationships" xmlns:p="http://schemas.openxmlformats.org/presentationml/2006/main">
+  <p:cSld>
+    <p:spTree>
+      <p:nvGrpSpPr>
+        <p:cNvPr id="1" name=""/>
+        <p:cNvGrpSpPr/>
+        <p:nvPr/>
+      </p:nvGrpSpPr>
+      <p:grpSpPr>
+        <a:xfrm>
+          <a:off x="0" y="0"/>
+          <a:ext cx="0" cy="0"/>
+          <a:chOff x="0" y="0"/>
+          <a:chExt cx="0" cy="0"/>
+        </a:xfrm>
+      </p:grpSpPr>
+      <p:sp>
+        <p:nvSpPr>
+          <p:cNvPr id="2" name="Título 1"/>
+          <p:cNvSpPr>
+            <a:spLocks noGrp="1"/>
+          </p:cNvSpPr>
+          <p:nvPr>
+            <p:ph type="title"/>
+          </p:nvPr>
+        </p:nvSpPr>
+        <p:spPr/>
+        <p:txBody>
+          <a:bodyPr/>
+          <a:lstStyle/>
+          <a:p>
+            <a:r>
+              <a:rPr lang="pt-BR" dirty="0" smtClean="0"/>
+              <a:t>Comando </a:t>
+            </a:r>
+            <a:r>
+              <a:rPr lang="pt-BR" dirty="0" err="1" smtClean="0">
+                <a:solidFill>
+                  <a:srgbClr val="92D050"/>
+                </a:solidFill>
+              </a:rPr>
+              <a:t>foreach</a:t>
+            </a:r>
+            <a:endParaRPr lang="pt-BR" dirty="0">
+              <a:solidFill>
+                <a:srgbClr val="92D050"/>
+              </a:solidFill>
+            </a:endParaRPr>
+          </a:p>
+        </p:txBody>
+      </p:sp>
+      <p:sp>
+        <p:nvSpPr>
+          <p:cNvPr id="3" name="Espaço Reservado para Conteúdo 2"/>
+          <p:cNvSpPr>
+            <a:spLocks noGrp="1"/>
+          </p:cNvSpPr>
+          <p:nvPr>
+            <p:ph idx="1"/>
+          </p:nvPr>
+        </p:nvSpPr>
+        <p:spPr/>
+        <p:txBody>
+          <a:bodyPr/>
+          <a:lstStyle/>
+          <a:p>
+            <a:r>
+              <a:rPr lang="pt-BR" dirty="0" smtClean="0"/>
+              <a:t>Comando de repetição bastante utilizado com vetores</a:t>
+            </a:r>
+          </a:p>
+          <a:p>
+            <a:r>
+              <a:rPr lang="pt-BR" dirty="0" smtClean="0"/>
+              <a:t>Simplifica a situação em que queremos percorrer </a:t>
+            </a:r>
+            <a:r>
+              <a:rPr lang="pt-BR" dirty="0" smtClean="0">
+                <a:solidFill>
+                  <a:srgbClr val="92D050"/>
+                </a:solidFill>
+              </a:rPr>
+              <a:t>todos</a:t>
+            </a:r>
+            <a:r>
+              <a:rPr lang="pt-BR" dirty="0" smtClean="0"/>
+              <a:t> os elementos do vetor, </a:t>
+            </a:r>
+            <a:r>
+              <a:rPr lang="pt-BR" dirty="0" smtClean="0">
+                <a:solidFill>
+                  <a:srgbClr val="92D050"/>
+                </a:solidFill>
+              </a:rPr>
+              <a:t>lendo apenas os valores</a:t>
+            </a:r>
+          </a:p>
+          <a:p>
+            <a:r>
+              <a:rPr lang="pt-BR" dirty="0" smtClean="0"/>
+              <a:t>Não permite a utilização de índice</a:t>
+            </a:r>
+          </a:p>
+          <a:p>
+            <a:r>
+              <a:rPr lang="pt-BR" dirty="0" smtClean="0"/>
+              <a:t>Uma variável do mesmo tipo do vetor deve ser declarada dentro do </a:t>
+            </a:r>
+            <a:r>
+              <a:rPr lang="pt-BR" dirty="0" err="1" smtClean="0">
+                <a:solidFill>
+                  <a:srgbClr val="92D050"/>
+                </a:solidFill>
+              </a:rPr>
+              <a:t>foreach</a:t>
+            </a:r>
+            <a:r>
+              <a:rPr lang="pt-BR" dirty="0" smtClean="0"/>
+              <a:t>, e existe somente nesse contexto</a:t>
+            </a:r>
+          </a:p>
+          <a:p>
+            <a:endParaRPr lang="pt-BR" dirty="0"/>
+          </a:p>
+        </p:txBody>
+      </p:sp>
+    </p:spTree>
+  </p:cSld>
+  <p:clrMapOvr>
+    <a:masterClrMapping/>
+  </p:clrMapOvr>
+</p:sld>
+</file>
+
+<file path=ppt/slides/slide34.xml><?xml version="1.0" encoding="utf-8"?>
+<p:sld xmlns:a="http://schemas.openxmlformats.org/drawingml/2006/main" xmlns:r="http://schemas.openxmlformats.org/officeDocument/2006/relationships" xmlns:p="http://schemas.openxmlformats.org/presentationml/2006/main">
+  <p:cSld>
+    <p:spTree>
+      <p:nvGrpSpPr>
+        <p:cNvPr id="1" name=""/>
+        <p:cNvGrpSpPr/>
+        <p:nvPr/>
+      </p:nvGrpSpPr>
+      <p:grpSpPr>
+        <a:xfrm>
+          <a:off x="0" y="0"/>
+          <a:ext cx="0" cy="0"/>
+          <a:chOff x="0" y="0"/>
+          <a:chExt cx="0" cy="0"/>
+        </a:xfrm>
+      </p:grpSpPr>
+      <p:sp>
+        <p:nvSpPr>
+          <p:cNvPr id="2" name="Título 1"/>
+          <p:cNvSpPr>
+            <a:spLocks noGrp="1"/>
+          </p:cNvSpPr>
+          <p:nvPr>
+            <p:ph type="title"/>
+          </p:nvPr>
+        </p:nvSpPr>
+        <p:spPr/>
+        <p:txBody>
+          <a:bodyPr/>
+          <a:lstStyle/>
+          <a:p>
+            <a:r>
+              <a:rPr lang="pt-BR" dirty="0" smtClean="0"/>
+              <a:t>Comando </a:t>
+            </a:r>
+            <a:r>
+              <a:rPr lang="pt-BR" dirty="0" err="1" smtClean="0">
+                <a:solidFill>
+                  <a:srgbClr val="92D050"/>
+                </a:solidFill>
+              </a:rPr>
+              <a:t>foreach</a:t>
+            </a:r>
+            <a:endParaRPr lang="pt-BR" dirty="0">
+              <a:solidFill>
+                <a:srgbClr val="92D050"/>
+              </a:solidFill>
+            </a:endParaRPr>
+          </a:p>
+        </p:txBody>
+      </p:sp>
+      <p:sp>
+        <p:nvSpPr>
+          <p:cNvPr id="3" name="Espaço Reservado para Conteúdo 2"/>
+          <p:cNvSpPr>
+            <a:spLocks noGrp="1"/>
+          </p:cNvSpPr>
+          <p:nvPr>
+            <p:ph idx="1"/>
+          </p:nvPr>
+        </p:nvSpPr>
+        <p:spPr/>
+        <p:txBody>
+          <a:bodyPr/>
+          <a:lstStyle/>
+          <a:p>
+            <a:r>
+              <a:rPr lang="pt-BR" dirty="0" smtClean="0"/>
+              <a:t>Exemplo: imprimir todos os elementos de um vetor de inteiros.</a:t>
+            </a:r>
+          </a:p>
+          <a:p>
+            <a:r>
+              <a:rPr lang="pt-BR" dirty="0" smtClean="0"/>
+              <a:t>Utilizando </a:t>
+            </a:r>
+            <a:r>
+              <a:rPr lang="pt-BR" dirty="0" smtClean="0">
+                <a:solidFill>
+                  <a:srgbClr val="92D050"/>
+                </a:solidFill>
+              </a:rPr>
+              <a:t>for</a:t>
+            </a:r>
+            <a:r>
+              <a:rPr lang="pt-BR" dirty="0" smtClean="0"/>
+              <a:t> (precisamos conhecer </a:t>
+            </a:r>
+            <a:r>
+              <a:rPr lang="pt-BR" b="1" dirty="0" smtClean="0">
+                <a:latin typeface="Courier New" pitchFamily="49" charset="0"/>
+                <a:cs typeface="Courier New" pitchFamily="49" charset="0"/>
+              </a:rPr>
+              <a:t>n</a:t>
+            </a:r>
+            <a:r>
+              <a:rPr lang="pt-BR" dirty="0" smtClean="0"/>
+              <a:t>):</a:t>
+            </a:r>
+          </a:p>
+          <a:p>
+            <a:pPr lvl="1"/>
+            <a:r>
+              <a:rPr lang="pt-BR" b="1" dirty="0" smtClean="0">
+                <a:latin typeface="Courier New" pitchFamily="49" charset="0"/>
+                <a:cs typeface="Courier New" pitchFamily="49" charset="0"/>
+              </a:rPr>
+              <a:t>for (</a:t>
+            </a:r>
+            <a:r>
+              <a:rPr lang="pt-BR" b="1" dirty="0" err="1" smtClean="0">
+                <a:latin typeface="Courier New" pitchFamily="49" charset="0"/>
+                <a:cs typeface="Courier New" pitchFamily="49" charset="0"/>
+              </a:rPr>
+              <a:t>int</a:t>
+            </a:r>
+            <a:r>
+              <a:rPr lang="pt-BR" b="1" dirty="0" smtClean="0">
+                <a:latin typeface="Courier New" pitchFamily="49" charset="0"/>
+                <a:cs typeface="Courier New" pitchFamily="49" charset="0"/>
+              </a:rPr>
+              <a:t> i = 0; i &lt; n; i++)</a:t>
+            </a:r>
+          </a:p>
+          <a:p>
+            <a:pPr lvl="2"/>
+            <a:r>
+              <a:rPr lang="pt-BR" b="1" dirty="0" smtClean="0">
+                <a:latin typeface="Courier New" pitchFamily="49" charset="0"/>
+                <a:cs typeface="Courier New" pitchFamily="49" charset="0"/>
+              </a:rPr>
+              <a:t>Console.</a:t>
+            </a:r>
+            <a:r>
+              <a:rPr lang="pt-BR" b="1" dirty="0" err="1" smtClean="0">
+                <a:latin typeface="Courier New" pitchFamily="49" charset="0"/>
+                <a:cs typeface="Courier New" pitchFamily="49" charset="0"/>
+              </a:rPr>
+              <a:t>WriteLine</a:t>
+            </a:r>
+            <a:r>
+              <a:rPr lang="pt-BR" b="1" dirty="0" smtClean="0">
+                <a:latin typeface="Courier New" pitchFamily="49" charset="0"/>
+                <a:cs typeface="Courier New" pitchFamily="49" charset="0"/>
+              </a:rPr>
+              <a:t>(vetor[i]);</a:t>
+            </a:r>
+          </a:p>
+          <a:p>
+            <a:r>
+              <a:rPr lang="pt-BR" dirty="0" smtClean="0"/>
+              <a:t>Utilizando </a:t>
+            </a:r>
+            <a:r>
+              <a:rPr lang="pt-BR" dirty="0" err="1" smtClean="0">
+                <a:solidFill>
+                  <a:srgbClr val="92D050"/>
+                </a:solidFill>
+              </a:rPr>
+              <a:t>foreach</a:t>
+            </a:r>
+            <a:r>
+              <a:rPr lang="pt-BR" dirty="0" smtClean="0"/>
+              <a:t>:</a:t>
+            </a:r>
+          </a:p>
+          <a:p>
+            <a:pPr lvl="1"/>
+            <a:r>
+              <a:rPr lang="pt-BR" b="1" dirty="0" err="1" smtClean="0">
+                <a:latin typeface="Courier New" pitchFamily="49" charset="0"/>
+                <a:cs typeface="Courier New" pitchFamily="49" charset="0"/>
+              </a:rPr>
+              <a:t>f</a:t>
+            </a:r>
+            <a:r>
+              <a:rPr lang="pt-BR" b="1" dirty="0" err="1" smtClean="0">
+                <a:latin typeface="Courier New" pitchFamily="49" charset="0"/>
+                <a:cs typeface="Courier New" pitchFamily="49" charset="0"/>
+              </a:rPr>
+              <a:t>oreach</a:t>
+            </a:r>
+            <a:r>
+              <a:rPr lang="pt-BR" b="1" dirty="0" smtClean="0">
+                <a:latin typeface="Courier New" pitchFamily="49" charset="0"/>
+                <a:cs typeface="Courier New" pitchFamily="49" charset="0"/>
+              </a:rPr>
+              <a:t> (</a:t>
+            </a:r>
+            <a:r>
+              <a:rPr lang="pt-BR" b="1" dirty="0" err="1" smtClean="0">
+                <a:latin typeface="Courier New" pitchFamily="49" charset="0"/>
+                <a:cs typeface="Courier New" pitchFamily="49" charset="0"/>
+              </a:rPr>
+              <a:t>int</a:t>
+            </a:r>
+            <a:r>
+              <a:rPr lang="pt-BR" b="1" dirty="0" smtClean="0">
+                <a:latin typeface="Courier New" pitchFamily="49" charset="0"/>
+                <a:cs typeface="Courier New" pitchFamily="49" charset="0"/>
+              </a:rPr>
+              <a:t> elem in vetor)</a:t>
+            </a:r>
+          </a:p>
+          <a:p>
+            <a:pPr lvl="2"/>
+            <a:r>
+              <a:rPr lang="pt-BR" b="1" dirty="0" smtClean="0">
+                <a:latin typeface="Courier New" pitchFamily="49" charset="0"/>
+                <a:cs typeface="Courier New" pitchFamily="49" charset="0"/>
+              </a:rPr>
+              <a:t>Console.</a:t>
+            </a:r>
+            <a:r>
+              <a:rPr lang="pt-BR" b="1" dirty="0" err="1" smtClean="0">
+                <a:latin typeface="Courier New" pitchFamily="49" charset="0"/>
+                <a:cs typeface="Courier New" pitchFamily="49" charset="0"/>
+              </a:rPr>
+              <a:t>WriteLine</a:t>
+            </a:r>
+            <a:r>
+              <a:rPr lang="pt-BR" b="1" dirty="0" smtClean="0">
+                <a:latin typeface="Courier New" pitchFamily="49" charset="0"/>
+                <a:cs typeface="Courier New" pitchFamily="49" charset="0"/>
+              </a:rPr>
+              <a:t>(elem);</a:t>
+            </a:r>
+            <a:endParaRPr lang="pt-BR" b="1" dirty="0">
+              <a:latin typeface="Courier New" pitchFamily="49" charset="0"/>
+              <a:cs typeface="Courier New" pitchFamily="49" charset="0"/>
+            </a:endParaRPr>
           </a:p>
         </p:txBody>
       </p:sp>

</xml_diff>